<commit_message>
fix trackarrow paint in .pptx file
</commit_message>
<xml_diff>
--- a/resource/testfile/参数需求.pptx
+++ b/resource/testfile/参数需求.pptx
@@ -107,6 +107,22 @@
       </a:defRPr>
     </a:lvl9pPr>
   </p:defaultTextStyle>
+  <p:extLst>
+    <p:ext uri="{EFAFB233-063F-42B5-8137-9DF3F51BA10A}">
+      <p15:sldGuideLst xmlns:p15="http://schemas.microsoft.com/office/powerpoint/2012/main">
+        <p15:guide id="1" orient="horz" pos="2160">
+          <p15:clr>
+            <a:srgbClr val="A4A3A4"/>
+          </p15:clr>
+        </p15:guide>
+        <p15:guide id="2" pos="2880">
+          <p15:clr>
+            <a:srgbClr val="A4A3A4"/>
+          </p15:clr>
+        </p15:guide>
+      </p15:sldGuideLst>
+    </p:ext>
+  </p:extLst>
 </p:presentation>
 </file>
 
@@ -148,10 +164,9 @@
           <a:lstStyle/>
           <a:p>
             <a:r>
-              <a:rPr lang="zh-CN" altLang="en-US" smtClean="0"/>
+              <a:rPr lang="zh-CN" altLang="en-US"/>
               <a:t>单击此处编辑母版标题样式</a:t>
             </a:r>
-            <a:endParaRPr lang="zh-CN" altLang="en-US"/>
           </a:p>
         </p:txBody>
       </p:sp>
@@ -267,10 +282,9 @@
           </a:lstStyle>
           <a:p>
             <a:r>
-              <a:rPr lang="zh-CN" altLang="en-US" smtClean="0"/>
+              <a:rPr lang="zh-CN" altLang="en-US"/>
               <a:t>单击此处编辑母版副标题样式</a:t>
             </a:r>
-            <a:endParaRPr lang="zh-CN" altLang="en-US"/>
           </a:p>
         </p:txBody>
       </p:sp>
@@ -291,7 +305,7 @@
           <a:p>
             <a:fld id="{530820CF-B880-4189-942D-D702A7CBA730}" type="datetimeFigureOut">
               <a:rPr lang="zh-CN" altLang="en-US" smtClean="0"/>
-              <a:t>2020/3/12</a:t>
+              <a:t>2020/12/12</a:t>
             </a:fld>
             <a:endParaRPr lang="zh-CN" altLang="en-US"/>
           </a:p>
@@ -380,10 +394,9 @@
           <a:lstStyle/>
           <a:p>
             <a:r>
-              <a:rPr lang="zh-CN" altLang="en-US" smtClean="0"/>
+              <a:rPr lang="zh-CN" altLang="en-US"/>
               <a:t>单击此处编辑母版标题样式</a:t>
             </a:r>
-            <a:endParaRPr lang="zh-CN" altLang="en-US"/>
           </a:p>
         </p:txBody>
       </p:sp>
@@ -404,38 +417,37 @@
           <a:p>
             <a:pPr lvl="0"/>
             <a:r>
-              <a:rPr lang="zh-CN" altLang="en-US" smtClean="0"/>
+              <a:rPr lang="zh-CN" altLang="en-US"/>
               <a:t>单击此处编辑母版文本样式</a:t>
             </a:r>
           </a:p>
           <a:p>
             <a:pPr lvl="1"/>
             <a:r>
-              <a:rPr lang="zh-CN" altLang="en-US" smtClean="0"/>
+              <a:rPr lang="zh-CN" altLang="en-US"/>
               <a:t>第二级</a:t>
             </a:r>
           </a:p>
           <a:p>
             <a:pPr lvl="2"/>
             <a:r>
-              <a:rPr lang="zh-CN" altLang="en-US" smtClean="0"/>
+              <a:rPr lang="zh-CN" altLang="en-US"/>
               <a:t>第三级</a:t>
             </a:r>
           </a:p>
           <a:p>
             <a:pPr lvl="3"/>
             <a:r>
-              <a:rPr lang="zh-CN" altLang="en-US" smtClean="0"/>
+              <a:rPr lang="zh-CN" altLang="en-US"/>
               <a:t>第四级</a:t>
             </a:r>
           </a:p>
           <a:p>
             <a:pPr lvl="4"/>
             <a:r>
-              <a:rPr lang="zh-CN" altLang="en-US" smtClean="0"/>
+              <a:rPr lang="zh-CN" altLang="en-US"/>
               <a:t>第五级</a:t>
             </a:r>
-            <a:endParaRPr lang="zh-CN" altLang="en-US"/>
           </a:p>
         </p:txBody>
       </p:sp>
@@ -456,7 +468,7 @@
           <a:p>
             <a:fld id="{530820CF-B880-4189-942D-D702A7CBA730}" type="datetimeFigureOut">
               <a:rPr lang="zh-CN" altLang="en-US" smtClean="0"/>
-              <a:t>2020/3/12</a:t>
+              <a:t>2020/12/12</a:t>
             </a:fld>
             <a:endParaRPr lang="zh-CN" altLang="en-US"/>
           </a:p>
@@ -550,10 +562,9 @@
           <a:lstStyle/>
           <a:p>
             <a:r>
-              <a:rPr lang="zh-CN" altLang="en-US" smtClean="0"/>
+              <a:rPr lang="zh-CN" altLang="en-US"/>
               <a:t>单击此处编辑母版标题样式</a:t>
             </a:r>
-            <a:endParaRPr lang="zh-CN" altLang="en-US"/>
           </a:p>
         </p:txBody>
       </p:sp>
@@ -579,38 +590,37 @@
           <a:p>
             <a:pPr lvl="0"/>
             <a:r>
-              <a:rPr lang="zh-CN" altLang="en-US" smtClean="0"/>
+              <a:rPr lang="zh-CN" altLang="en-US"/>
               <a:t>单击此处编辑母版文本样式</a:t>
             </a:r>
           </a:p>
           <a:p>
             <a:pPr lvl="1"/>
             <a:r>
-              <a:rPr lang="zh-CN" altLang="en-US" smtClean="0"/>
+              <a:rPr lang="zh-CN" altLang="en-US"/>
               <a:t>第二级</a:t>
             </a:r>
           </a:p>
           <a:p>
             <a:pPr lvl="2"/>
             <a:r>
-              <a:rPr lang="zh-CN" altLang="en-US" smtClean="0"/>
+              <a:rPr lang="zh-CN" altLang="en-US"/>
               <a:t>第三级</a:t>
             </a:r>
           </a:p>
           <a:p>
             <a:pPr lvl="3"/>
             <a:r>
-              <a:rPr lang="zh-CN" altLang="en-US" smtClean="0"/>
+              <a:rPr lang="zh-CN" altLang="en-US"/>
               <a:t>第四级</a:t>
             </a:r>
           </a:p>
           <a:p>
             <a:pPr lvl="4"/>
             <a:r>
-              <a:rPr lang="zh-CN" altLang="en-US" smtClean="0"/>
+              <a:rPr lang="zh-CN" altLang="en-US"/>
               <a:t>第五级</a:t>
             </a:r>
-            <a:endParaRPr lang="zh-CN" altLang="en-US"/>
           </a:p>
         </p:txBody>
       </p:sp>
@@ -631,7 +641,7 @@
           <a:p>
             <a:fld id="{530820CF-B880-4189-942D-D702A7CBA730}" type="datetimeFigureOut">
               <a:rPr lang="zh-CN" altLang="en-US" smtClean="0"/>
-              <a:t>2020/3/12</a:t>
+              <a:t>2020/12/12</a:t>
             </a:fld>
             <a:endParaRPr lang="zh-CN" altLang="en-US"/>
           </a:p>
@@ -720,10 +730,9 @@
           <a:lstStyle/>
           <a:p>
             <a:r>
-              <a:rPr lang="zh-CN" altLang="en-US" smtClean="0"/>
+              <a:rPr lang="zh-CN" altLang="en-US"/>
               <a:t>单击此处编辑母版标题样式</a:t>
             </a:r>
-            <a:endParaRPr lang="zh-CN" altLang="en-US"/>
           </a:p>
         </p:txBody>
       </p:sp>
@@ -744,38 +753,37 @@
           <a:p>
             <a:pPr lvl="0"/>
             <a:r>
-              <a:rPr lang="zh-CN" altLang="en-US" smtClean="0"/>
+              <a:rPr lang="zh-CN" altLang="en-US"/>
               <a:t>单击此处编辑母版文本样式</a:t>
             </a:r>
           </a:p>
           <a:p>
             <a:pPr lvl="1"/>
             <a:r>
-              <a:rPr lang="zh-CN" altLang="en-US" smtClean="0"/>
+              <a:rPr lang="zh-CN" altLang="en-US"/>
               <a:t>第二级</a:t>
             </a:r>
           </a:p>
           <a:p>
             <a:pPr lvl="2"/>
             <a:r>
-              <a:rPr lang="zh-CN" altLang="en-US" smtClean="0"/>
+              <a:rPr lang="zh-CN" altLang="en-US"/>
               <a:t>第三级</a:t>
             </a:r>
           </a:p>
           <a:p>
             <a:pPr lvl="3"/>
             <a:r>
-              <a:rPr lang="zh-CN" altLang="en-US" smtClean="0"/>
+              <a:rPr lang="zh-CN" altLang="en-US"/>
               <a:t>第四级</a:t>
             </a:r>
           </a:p>
           <a:p>
             <a:pPr lvl="4"/>
             <a:r>
-              <a:rPr lang="zh-CN" altLang="en-US" smtClean="0"/>
+              <a:rPr lang="zh-CN" altLang="en-US"/>
               <a:t>第五级</a:t>
             </a:r>
-            <a:endParaRPr lang="zh-CN" altLang="en-US"/>
           </a:p>
         </p:txBody>
       </p:sp>
@@ -796,7 +804,7 @@
           <a:p>
             <a:fld id="{530820CF-B880-4189-942D-D702A7CBA730}" type="datetimeFigureOut">
               <a:rPr lang="zh-CN" altLang="en-US" smtClean="0"/>
-              <a:t>2020/3/12</a:t>
+              <a:t>2020/12/12</a:t>
             </a:fld>
             <a:endParaRPr lang="zh-CN" altLang="en-US"/>
           </a:p>
@@ -894,10 +902,9 @@
           </a:lstStyle>
           <a:p>
             <a:r>
-              <a:rPr lang="zh-CN" altLang="en-US" smtClean="0"/>
+              <a:rPr lang="zh-CN" altLang="en-US"/>
               <a:t>单击此处编辑母版标题样式</a:t>
             </a:r>
-            <a:endParaRPr lang="zh-CN" altLang="en-US"/>
           </a:p>
         </p:txBody>
       </p:sp>
@@ -1014,7 +1021,7 @@
           <a:p>
             <a:pPr lvl="0"/>
             <a:r>
-              <a:rPr lang="zh-CN" altLang="en-US" smtClean="0"/>
+              <a:rPr lang="zh-CN" altLang="en-US"/>
               <a:t>单击此处编辑母版文本样式</a:t>
             </a:r>
           </a:p>
@@ -1037,7 +1044,7 @@
           <a:p>
             <a:fld id="{530820CF-B880-4189-942D-D702A7CBA730}" type="datetimeFigureOut">
               <a:rPr lang="zh-CN" altLang="en-US" smtClean="0"/>
-              <a:t>2020/3/12</a:t>
+              <a:t>2020/12/12</a:t>
             </a:fld>
             <a:endParaRPr lang="zh-CN" altLang="en-US"/>
           </a:p>
@@ -1126,10 +1133,9 @@
           <a:lstStyle/>
           <a:p>
             <a:r>
-              <a:rPr lang="zh-CN" altLang="en-US" smtClean="0"/>
+              <a:rPr lang="zh-CN" altLang="en-US"/>
               <a:t>单击此处编辑母版标题样式</a:t>
             </a:r>
-            <a:endParaRPr lang="zh-CN" altLang="en-US"/>
           </a:p>
         </p:txBody>
       </p:sp>
@@ -1183,38 +1189,37 @@
           <a:p>
             <a:pPr lvl="0"/>
             <a:r>
-              <a:rPr lang="zh-CN" altLang="en-US" smtClean="0"/>
+              <a:rPr lang="zh-CN" altLang="en-US"/>
               <a:t>单击此处编辑母版文本样式</a:t>
             </a:r>
           </a:p>
           <a:p>
             <a:pPr lvl="1"/>
             <a:r>
-              <a:rPr lang="zh-CN" altLang="en-US" smtClean="0"/>
+              <a:rPr lang="zh-CN" altLang="en-US"/>
               <a:t>第二级</a:t>
             </a:r>
           </a:p>
           <a:p>
             <a:pPr lvl="2"/>
             <a:r>
-              <a:rPr lang="zh-CN" altLang="en-US" smtClean="0"/>
+              <a:rPr lang="zh-CN" altLang="en-US"/>
               <a:t>第三级</a:t>
             </a:r>
           </a:p>
           <a:p>
             <a:pPr lvl="3"/>
             <a:r>
-              <a:rPr lang="zh-CN" altLang="en-US" smtClean="0"/>
+              <a:rPr lang="zh-CN" altLang="en-US"/>
               <a:t>第四级</a:t>
             </a:r>
           </a:p>
           <a:p>
             <a:pPr lvl="4"/>
             <a:r>
-              <a:rPr lang="zh-CN" altLang="en-US" smtClean="0"/>
+              <a:rPr lang="zh-CN" altLang="en-US"/>
               <a:t>第五级</a:t>
             </a:r>
-            <a:endParaRPr lang="zh-CN" altLang="en-US"/>
           </a:p>
         </p:txBody>
       </p:sp>
@@ -1268,38 +1273,37 @@
           <a:p>
             <a:pPr lvl="0"/>
             <a:r>
-              <a:rPr lang="zh-CN" altLang="en-US" smtClean="0"/>
+              <a:rPr lang="zh-CN" altLang="en-US"/>
               <a:t>单击此处编辑母版文本样式</a:t>
             </a:r>
           </a:p>
           <a:p>
             <a:pPr lvl="1"/>
             <a:r>
-              <a:rPr lang="zh-CN" altLang="en-US" smtClean="0"/>
+              <a:rPr lang="zh-CN" altLang="en-US"/>
               <a:t>第二级</a:t>
             </a:r>
           </a:p>
           <a:p>
             <a:pPr lvl="2"/>
             <a:r>
-              <a:rPr lang="zh-CN" altLang="en-US" smtClean="0"/>
+              <a:rPr lang="zh-CN" altLang="en-US"/>
               <a:t>第三级</a:t>
             </a:r>
           </a:p>
           <a:p>
             <a:pPr lvl="3"/>
             <a:r>
-              <a:rPr lang="zh-CN" altLang="en-US" smtClean="0"/>
+              <a:rPr lang="zh-CN" altLang="en-US"/>
               <a:t>第四级</a:t>
             </a:r>
           </a:p>
           <a:p>
             <a:pPr lvl="4"/>
             <a:r>
-              <a:rPr lang="zh-CN" altLang="en-US" smtClean="0"/>
+              <a:rPr lang="zh-CN" altLang="en-US"/>
               <a:t>第五级</a:t>
             </a:r>
-            <a:endParaRPr lang="zh-CN" altLang="en-US"/>
           </a:p>
         </p:txBody>
       </p:sp>
@@ -1320,7 +1324,7 @@
           <a:p>
             <a:fld id="{530820CF-B880-4189-942D-D702A7CBA730}" type="datetimeFigureOut">
               <a:rPr lang="zh-CN" altLang="en-US" smtClean="0"/>
-              <a:t>2020/3/12</a:t>
+              <a:t>2020/12/12</a:t>
             </a:fld>
             <a:endParaRPr lang="zh-CN" altLang="en-US"/>
           </a:p>
@@ -1413,10 +1417,9 @@
           </a:lstStyle>
           <a:p>
             <a:r>
-              <a:rPr lang="zh-CN" altLang="en-US" smtClean="0"/>
+              <a:rPr lang="zh-CN" altLang="en-US"/>
               <a:t>单击此处编辑母版标题样式</a:t>
             </a:r>
-            <a:endParaRPr lang="zh-CN" altLang="en-US"/>
           </a:p>
         </p:txBody>
       </p:sp>
@@ -1479,7 +1482,7 @@
           <a:p>
             <a:pPr lvl="0"/>
             <a:r>
-              <a:rPr lang="zh-CN" altLang="en-US" smtClean="0"/>
+              <a:rPr lang="zh-CN" altLang="en-US"/>
               <a:t>单击此处编辑母版文本样式</a:t>
             </a:r>
           </a:p>
@@ -1535,38 +1538,37 @@
           <a:p>
             <a:pPr lvl="0"/>
             <a:r>
-              <a:rPr lang="zh-CN" altLang="en-US" smtClean="0"/>
+              <a:rPr lang="zh-CN" altLang="en-US"/>
               <a:t>单击此处编辑母版文本样式</a:t>
             </a:r>
           </a:p>
           <a:p>
             <a:pPr lvl="1"/>
             <a:r>
-              <a:rPr lang="zh-CN" altLang="en-US" smtClean="0"/>
+              <a:rPr lang="zh-CN" altLang="en-US"/>
               <a:t>第二级</a:t>
             </a:r>
           </a:p>
           <a:p>
             <a:pPr lvl="2"/>
             <a:r>
-              <a:rPr lang="zh-CN" altLang="en-US" smtClean="0"/>
+              <a:rPr lang="zh-CN" altLang="en-US"/>
               <a:t>第三级</a:t>
             </a:r>
           </a:p>
           <a:p>
             <a:pPr lvl="3"/>
             <a:r>
-              <a:rPr lang="zh-CN" altLang="en-US" smtClean="0"/>
+              <a:rPr lang="zh-CN" altLang="en-US"/>
               <a:t>第四级</a:t>
             </a:r>
           </a:p>
           <a:p>
             <a:pPr lvl="4"/>
             <a:r>
-              <a:rPr lang="zh-CN" altLang="en-US" smtClean="0"/>
+              <a:rPr lang="zh-CN" altLang="en-US"/>
               <a:t>第五级</a:t>
             </a:r>
-            <a:endParaRPr lang="zh-CN" altLang="en-US"/>
           </a:p>
         </p:txBody>
       </p:sp>
@@ -1629,7 +1631,7 @@
           <a:p>
             <a:pPr lvl="0"/>
             <a:r>
-              <a:rPr lang="zh-CN" altLang="en-US" smtClean="0"/>
+              <a:rPr lang="zh-CN" altLang="en-US"/>
               <a:t>单击此处编辑母版文本样式</a:t>
             </a:r>
           </a:p>
@@ -1685,38 +1687,37 @@
           <a:p>
             <a:pPr lvl="0"/>
             <a:r>
-              <a:rPr lang="zh-CN" altLang="en-US" smtClean="0"/>
+              <a:rPr lang="zh-CN" altLang="en-US"/>
               <a:t>单击此处编辑母版文本样式</a:t>
             </a:r>
           </a:p>
           <a:p>
             <a:pPr lvl="1"/>
             <a:r>
-              <a:rPr lang="zh-CN" altLang="en-US" smtClean="0"/>
+              <a:rPr lang="zh-CN" altLang="en-US"/>
               <a:t>第二级</a:t>
             </a:r>
           </a:p>
           <a:p>
             <a:pPr lvl="2"/>
             <a:r>
-              <a:rPr lang="zh-CN" altLang="en-US" smtClean="0"/>
+              <a:rPr lang="zh-CN" altLang="en-US"/>
               <a:t>第三级</a:t>
             </a:r>
           </a:p>
           <a:p>
             <a:pPr lvl="3"/>
             <a:r>
-              <a:rPr lang="zh-CN" altLang="en-US" smtClean="0"/>
+              <a:rPr lang="zh-CN" altLang="en-US"/>
               <a:t>第四级</a:t>
             </a:r>
           </a:p>
           <a:p>
             <a:pPr lvl="4"/>
             <a:r>
-              <a:rPr lang="zh-CN" altLang="en-US" smtClean="0"/>
+              <a:rPr lang="zh-CN" altLang="en-US"/>
               <a:t>第五级</a:t>
             </a:r>
-            <a:endParaRPr lang="zh-CN" altLang="en-US"/>
           </a:p>
         </p:txBody>
       </p:sp>
@@ -1737,7 +1738,7 @@
           <a:p>
             <a:fld id="{530820CF-B880-4189-942D-D702A7CBA730}" type="datetimeFigureOut">
               <a:rPr lang="zh-CN" altLang="en-US" smtClean="0"/>
-              <a:t>2020/3/12</a:t>
+              <a:t>2020/12/12</a:t>
             </a:fld>
             <a:endParaRPr lang="zh-CN" altLang="en-US"/>
           </a:p>
@@ -1826,10 +1827,9 @@
           <a:lstStyle/>
           <a:p>
             <a:r>
-              <a:rPr lang="zh-CN" altLang="en-US" smtClean="0"/>
+              <a:rPr lang="zh-CN" altLang="en-US"/>
               <a:t>单击此处编辑母版标题样式</a:t>
             </a:r>
-            <a:endParaRPr lang="zh-CN" altLang="en-US"/>
           </a:p>
         </p:txBody>
       </p:sp>
@@ -1850,7 +1850,7 @@
           <a:p>
             <a:fld id="{530820CF-B880-4189-942D-D702A7CBA730}" type="datetimeFigureOut">
               <a:rPr lang="zh-CN" altLang="en-US" smtClean="0"/>
-              <a:t>2020/3/12</a:t>
+              <a:t>2020/12/12</a:t>
             </a:fld>
             <a:endParaRPr lang="zh-CN" altLang="en-US"/>
           </a:p>
@@ -1940,7 +1940,7 @@
           <a:p>
             <a:fld id="{530820CF-B880-4189-942D-D702A7CBA730}" type="datetimeFigureOut">
               <a:rPr lang="zh-CN" altLang="en-US" smtClean="0"/>
-              <a:t>2020/3/12</a:t>
+              <a:t>2020/12/12</a:t>
             </a:fld>
             <a:endParaRPr lang="zh-CN" altLang="en-US"/>
           </a:p>
@@ -2038,10 +2038,9 @@
           </a:lstStyle>
           <a:p>
             <a:r>
-              <a:rPr lang="zh-CN" altLang="en-US" smtClean="0"/>
+              <a:rPr lang="zh-CN" altLang="en-US"/>
               <a:t>单击此处编辑母版标题样式</a:t>
             </a:r>
-            <a:endParaRPr lang="zh-CN" altLang="en-US"/>
           </a:p>
         </p:txBody>
       </p:sp>
@@ -2095,38 +2094,37 @@
           <a:p>
             <a:pPr lvl="0"/>
             <a:r>
-              <a:rPr lang="zh-CN" altLang="en-US" smtClean="0"/>
+              <a:rPr lang="zh-CN" altLang="en-US"/>
               <a:t>单击此处编辑母版文本样式</a:t>
             </a:r>
           </a:p>
           <a:p>
             <a:pPr lvl="1"/>
             <a:r>
-              <a:rPr lang="zh-CN" altLang="en-US" smtClean="0"/>
+              <a:rPr lang="zh-CN" altLang="en-US"/>
               <a:t>第二级</a:t>
             </a:r>
           </a:p>
           <a:p>
             <a:pPr lvl="2"/>
             <a:r>
-              <a:rPr lang="zh-CN" altLang="en-US" smtClean="0"/>
+              <a:rPr lang="zh-CN" altLang="en-US"/>
               <a:t>第三级</a:t>
             </a:r>
           </a:p>
           <a:p>
             <a:pPr lvl="3"/>
             <a:r>
-              <a:rPr lang="zh-CN" altLang="en-US" smtClean="0"/>
+              <a:rPr lang="zh-CN" altLang="en-US"/>
               <a:t>第四级</a:t>
             </a:r>
           </a:p>
           <a:p>
             <a:pPr lvl="4"/>
             <a:r>
-              <a:rPr lang="zh-CN" altLang="en-US" smtClean="0"/>
+              <a:rPr lang="zh-CN" altLang="en-US"/>
               <a:t>第五级</a:t>
             </a:r>
-            <a:endParaRPr lang="zh-CN" altLang="en-US"/>
           </a:p>
         </p:txBody>
       </p:sp>
@@ -2189,7 +2187,7 @@
           <a:p>
             <a:pPr lvl="0"/>
             <a:r>
-              <a:rPr lang="zh-CN" altLang="en-US" smtClean="0"/>
+              <a:rPr lang="zh-CN" altLang="en-US"/>
               <a:t>单击此处编辑母版文本样式</a:t>
             </a:r>
           </a:p>
@@ -2212,7 +2210,7 @@
           <a:p>
             <a:fld id="{530820CF-B880-4189-942D-D702A7CBA730}" type="datetimeFigureOut">
               <a:rPr lang="zh-CN" altLang="en-US" smtClean="0"/>
-              <a:t>2020/3/12</a:t>
+              <a:t>2020/12/12</a:t>
             </a:fld>
             <a:endParaRPr lang="zh-CN" altLang="en-US"/>
           </a:p>
@@ -2310,10 +2308,9 @@
           </a:lstStyle>
           <a:p>
             <a:r>
-              <a:rPr lang="zh-CN" altLang="en-US" smtClean="0"/>
+              <a:rPr lang="zh-CN" altLang="en-US"/>
               <a:t>单击此处编辑母版标题样式</a:t>
             </a:r>
-            <a:endParaRPr lang="zh-CN" altLang="en-US"/>
           </a:p>
         </p:txBody>
       </p:sp>
@@ -2437,7 +2434,7 @@
           <a:p>
             <a:pPr lvl="0"/>
             <a:r>
-              <a:rPr lang="zh-CN" altLang="en-US" smtClean="0"/>
+              <a:rPr lang="zh-CN" altLang="en-US"/>
               <a:t>单击此处编辑母版文本样式</a:t>
             </a:r>
           </a:p>
@@ -2460,7 +2457,7 @@
           <a:p>
             <a:fld id="{530820CF-B880-4189-942D-D702A7CBA730}" type="datetimeFigureOut">
               <a:rPr lang="zh-CN" altLang="en-US" smtClean="0"/>
-              <a:t>2020/3/12</a:t>
+              <a:t>2020/12/12</a:t>
             </a:fld>
             <a:endParaRPr lang="zh-CN" altLang="en-US"/>
           </a:p>
@@ -2564,10 +2561,9 @@
           <a:lstStyle/>
           <a:p>
             <a:r>
-              <a:rPr lang="zh-CN" altLang="en-US" smtClean="0"/>
+              <a:rPr lang="zh-CN" altLang="en-US"/>
               <a:t>单击此处编辑母版标题样式</a:t>
             </a:r>
-            <a:endParaRPr lang="zh-CN" altLang="en-US"/>
           </a:p>
         </p:txBody>
       </p:sp>
@@ -2598,38 +2594,37 @@
           <a:p>
             <a:pPr lvl="0"/>
             <a:r>
-              <a:rPr lang="zh-CN" altLang="en-US" smtClean="0"/>
+              <a:rPr lang="zh-CN" altLang="en-US"/>
               <a:t>单击此处编辑母版文本样式</a:t>
             </a:r>
           </a:p>
           <a:p>
             <a:pPr lvl="1"/>
             <a:r>
-              <a:rPr lang="zh-CN" altLang="en-US" smtClean="0"/>
+              <a:rPr lang="zh-CN" altLang="en-US"/>
               <a:t>第二级</a:t>
             </a:r>
           </a:p>
           <a:p>
             <a:pPr lvl="2"/>
             <a:r>
-              <a:rPr lang="zh-CN" altLang="en-US" smtClean="0"/>
+              <a:rPr lang="zh-CN" altLang="en-US"/>
               <a:t>第三级</a:t>
             </a:r>
           </a:p>
           <a:p>
             <a:pPr lvl="3"/>
             <a:r>
-              <a:rPr lang="zh-CN" altLang="en-US" smtClean="0"/>
+              <a:rPr lang="zh-CN" altLang="en-US"/>
               <a:t>第四级</a:t>
             </a:r>
           </a:p>
           <a:p>
             <a:pPr lvl="4"/>
             <a:r>
-              <a:rPr lang="zh-CN" altLang="en-US" smtClean="0"/>
+              <a:rPr lang="zh-CN" altLang="en-US"/>
               <a:t>第五级</a:t>
             </a:r>
-            <a:endParaRPr lang="zh-CN" altLang="en-US"/>
           </a:p>
         </p:txBody>
       </p:sp>
@@ -2668,7 +2663,7 @@
           <a:p>
             <a:fld id="{530820CF-B880-4189-942D-D702A7CBA730}" type="datetimeFigureOut">
               <a:rPr lang="zh-CN" altLang="en-US" smtClean="0"/>
-              <a:t>2020/3/12</a:t>
+              <a:t>2020/12/12</a:t>
             </a:fld>
             <a:endParaRPr lang="zh-CN" altLang="en-US"/>
           </a:p>
@@ -3125,35 +3120,35 @@
           <a:lstStyle/>
           <a:p>
             <a:r>
-              <a:rPr lang="zh-CN" altLang="en-US" dirty="0" smtClean="0"/>
+              <a:rPr lang="zh-CN" altLang="en-US" dirty="0"/>
               <a:t>参数：</a:t>
             </a:r>
-            <a:endParaRPr lang="en-US" altLang="zh-CN" dirty="0" smtClean="0"/>
-          </a:p>
-          <a:p>
             <a:endParaRPr lang="en-US" altLang="zh-CN" dirty="0"/>
           </a:p>
           <a:p>
-            <a:r>
-              <a:rPr lang="en-US" altLang="zh-CN" dirty="0" smtClean="0"/>
+            <a:endParaRPr lang="en-US" altLang="zh-CN" dirty="0"/>
+          </a:p>
+          <a:p>
+            <a:r>
+              <a:rPr lang="en-US" altLang="zh-CN" dirty="0"/>
               <a:t>Gap</a:t>
             </a:r>
             <a:r>
-              <a:rPr lang="zh-CN" altLang="en-US" dirty="0" smtClean="0"/>
+              <a:rPr lang="zh-CN" altLang="en-US" dirty="0"/>
               <a:t>： </a:t>
             </a:r>
             <a:r>
-              <a:rPr lang="en-US" altLang="zh-CN" dirty="0" smtClean="0"/>
+              <a:rPr lang="en-US" altLang="zh-CN" dirty="0"/>
               <a:t>1</a:t>
             </a:r>
           </a:p>
           <a:p>
             <a:r>
-              <a:rPr lang="en-US" altLang="zh-CN" dirty="0" err="1" smtClean="0"/>
+              <a:rPr lang="en-US" altLang="zh-CN" dirty="0" err="1"/>
               <a:t>gapCAT</a:t>
             </a:r>
             <a:r>
-              <a:rPr lang="en-US" altLang="zh-CN" dirty="0" smtClean="0"/>
+              <a:rPr lang="en-US" altLang="zh-CN" dirty="0"/>
               <a:t>: 1.5</a:t>
             </a:r>
           </a:p>
@@ -3183,10 +3178,9 @@
               <a:t>否则忽视</a:t>
             </a:r>
             <a:r>
-              <a:rPr lang="en-US" altLang="zh-CN" sz="1600" dirty="0" smtClean="0"/>
+              <a:rPr lang="en-US" altLang="zh-CN" sz="1600" dirty="0"/>
               <a:t>)</a:t>
             </a:r>
-            <a:endParaRPr lang="en-US" altLang="zh-CN" sz="1600" dirty="0"/>
           </a:p>
         </p:txBody>
       </p:sp>
@@ -3277,14 +3271,13 @@
           <a:lstStyle/>
           <a:p>
             <a:r>
-              <a:rPr lang="en-US" altLang="zh-CN" dirty="0" smtClean="0"/>
+              <a:rPr lang="en-US" altLang="zh-CN" dirty="0"/>
               <a:t>Backbone file</a:t>
             </a:r>
             <a:r>
-              <a:rPr lang="zh-CN" altLang="en-US" dirty="0" smtClean="0"/>
+              <a:rPr lang="zh-CN" altLang="en-US" dirty="0"/>
               <a:t>相关</a:t>
             </a:r>
-            <a:endParaRPr lang="zh-CN" altLang="en-US" dirty="0"/>
           </a:p>
         </p:txBody>
       </p:sp>
@@ -3373,7 +3366,7 @@
           <a:lstStyle/>
           <a:p>
             <a:r>
-              <a:rPr lang="en-US" altLang="zh-CN" dirty="0" smtClean="0"/>
+              <a:rPr lang="en-US" altLang="zh-CN" dirty="0"/>
               <a:t>or</a:t>
             </a:r>
             <a:endParaRPr lang="zh-CN" altLang="en-US" dirty="0"/>
@@ -3403,10 +3396,9 @@
           <a:lstStyle/>
           <a:p>
             <a:r>
-              <a:rPr lang="zh-CN" altLang="en-US" dirty="0" smtClean="0"/>
+              <a:rPr lang="zh-CN" altLang="en-US" dirty="0"/>
               <a:t>数据格式</a:t>
             </a:r>
-            <a:endParaRPr lang="zh-CN" altLang="en-US" dirty="0"/>
           </a:p>
         </p:txBody>
       </p:sp>
@@ -3433,93 +3425,93 @@
           <a:lstStyle/>
           <a:p>
             <a:r>
-              <a:rPr lang="en-US" altLang="zh-CN" sz="1400" dirty="0" smtClean="0"/>
+              <a:rPr lang="en-US" altLang="zh-CN" sz="1400" dirty="0"/>
               <a:t>Gap</a:t>
             </a:r>
             <a:r>
-              <a:rPr lang="zh-CN" altLang="en-US" sz="1400" dirty="0" smtClean="0"/>
+              <a:rPr lang="zh-CN" altLang="en-US" sz="1400" dirty="0"/>
               <a:t>的单位是度数</a:t>
             </a:r>
-            <a:endParaRPr lang="en-US" altLang="zh-CN" sz="1400" dirty="0" smtClean="0"/>
-          </a:p>
-          <a:p>
-            <a:r>
-              <a:rPr lang="en-US" altLang="zh-CN" sz="1400" dirty="0" smtClean="0"/>
+            <a:endParaRPr lang="en-US" altLang="zh-CN" sz="1400" dirty="0"/>
+          </a:p>
+          <a:p>
+            <a:r>
+              <a:rPr lang="en-US" altLang="zh-CN" sz="1400" dirty="0"/>
               <a:t>Gap</a:t>
             </a:r>
             <a:r>
-              <a:rPr lang="zh-CN" altLang="en-US" sz="1400" dirty="0" smtClean="0"/>
+              <a:rPr lang="zh-CN" altLang="en-US" sz="1400" dirty="0"/>
               <a:t>为每一个</a:t>
             </a:r>
             <a:r>
-              <a:rPr lang="en-US" altLang="zh-CN" sz="1400" dirty="0" smtClean="0"/>
+              <a:rPr lang="en-US" altLang="zh-CN" sz="1400" dirty="0"/>
               <a:t>gene name</a:t>
             </a:r>
             <a:r>
-              <a:rPr lang="zh-CN" altLang="en-US" sz="1400" dirty="0" smtClean="0"/>
+              <a:rPr lang="zh-CN" altLang="en-US" sz="1400" dirty="0"/>
               <a:t>之间的间隔度数</a:t>
             </a:r>
-            <a:endParaRPr lang="en-US" altLang="zh-CN" sz="1400" dirty="0" smtClean="0"/>
-          </a:p>
-          <a:p>
-            <a:r>
-              <a:rPr lang="en-US" altLang="zh-CN" sz="1400" dirty="0" err="1" smtClean="0"/>
+            <a:endParaRPr lang="en-US" altLang="zh-CN" sz="1400" dirty="0"/>
+          </a:p>
+          <a:p>
+            <a:r>
+              <a:rPr lang="en-US" altLang="zh-CN" sz="1400" dirty="0" err="1"/>
               <a:t>gapCAT</a:t>
             </a:r>
             <a:r>
-              <a:rPr lang="zh-CN" altLang="en-US" sz="1400" dirty="0" smtClean="0"/>
+              <a:rPr lang="zh-CN" altLang="en-US" sz="1400" dirty="0"/>
               <a:t>为每一个</a:t>
             </a:r>
             <a:r>
-              <a:rPr lang="en-US" altLang="zh-CN" sz="1400" dirty="0" smtClean="0"/>
+              <a:rPr lang="en-US" altLang="zh-CN" sz="1400" dirty="0"/>
               <a:t>category</a:t>
             </a:r>
             <a:r>
-              <a:rPr lang="zh-CN" altLang="en-US" sz="1400" dirty="0" smtClean="0"/>
+              <a:rPr lang="zh-CN" altLang="en-US" sz="1400" dirty="0"/>
               <a:t>之间的间隔度数，即当有</a:t>
             </a:r>
             <a:r>
-              <a:rPr lang="en-US" altLang="zh-CN" sz="1400" dirty="0" smtClean="0"/>
+              <a:rPr lang="en-US" altLang="zh-CN" sz="1400" dirty="0"/>
               <a:t>category file</a:t>
             </a:r>
             <a:r>
-              <a:rPr lang="zh-CN" altLang="en-US" sz="1400" dirty="0" smtClean="0"/>
+              <a:rPr lang="zh-CN" altLang="en-US" sz="1400" dirty="0"/>
               <a:t>时</a:t>
             </a:r>
             <a:r>
-              <a:rPr lang="en-US" altLang="zh-CN" sz="1400" dirty="0" smtClean="0"/>
+              <a:rPr lang="en-US" altLang="zh-CN" sz="1400" dirty="0"/>
               <a:t>,cat</a:t>
             </a:r>
             <a:r>
-              <a:rPr lang="zh-CN" altLang="en-US" sz="1400" dirty="0" smtClean="0"/>
+              <a:rPr lang="zh-CN" altLang="en-US" sz="1400" dirty="0"/>
               <a:t>内部的基因</a:t>
             </a:r>
             <a:r>
-              <a:rPr lang="en-US" altLang="zh-CN" sz="1400" dirty="0" smtClean="0"/>
+              <a:rPr lang="en-US" altLang="zh-CN" sz="1400" dirty="0"/>
               <a:t>gap</a:t>
             </a:r>
             <a:r>
-              <a:rPr lang="zh-CN" altLang="en-US" sz="1400" dirty="0" smtClean="0"/>
+              <a:rPr lang="zh-CN" altLang="en-US" sz="1400" dirty="0"/>
               <a:t>是</a:t>
             </a:r>
             <a:r>
-              <a:rPr lang="en-US" altLang="zh-CN" sz="1400" dirty="0" smtClean="0"/>
+              <a:rPr lang="en-US" altLang="zh-CN" sz="1400" dirty="0"/>
               <a:t>1,,Cat</a:t>
             </a:r>
             <a:r>
-              <a:rPr lang="zh-CN" altLang="en-US" sz="1400" dirty="0" smtClean="0"/>
+              <a:rPr lang="zh-CN" altLang="en-US" sz="1400" dirty="0"/>
               <a:t>间的</a:t>
             </a:r>
             <a:r>
-              <a:rPr lang="en-US" altLang="zh-CN" sz="1400" dirty="0" smtClean="0"/>
+              <a:rPr lang="en-US" altLang="zh-CN" sz="1400" dirty="0"/>
               <a:t>gap</a:t>
             </a:r>
             <a:r>
-              <a:rPr lang="zh-CN" altLang="en-US" sz="1400" dirty="0" smtClean="0"/>
+              <a:rPr lang="zh-CN" altLang="en-US" sz="1400" dirty="0"/>
               <a:t>是</a:t>
             </a:r>
             <a:r>
-              <a:rPr lang="en-US" altLang="zh-CN" sz="1400" dirty="0" smtClean="0"/>
+              <a:rPr lang="en-US" altLang="zh-CN" sz="1400" dirty="0"/>
               <a:t>1.5</a:t>
             </a:r>
             <a:endParaRPr lang="zh-CN" altLang="en-US" sz="1400" dirty="0"/>
@@ -3548,72 +3540,72 @@
           <a:lstStyle/>
           <a:p>
             <a:r>
-              <a:rPr lang="en-US" altLang="zh-CN" dirty="0" smtClean="0"/>
+              <a:rPr lang="en-US" altLang="zh-CN" dirty="0"/>
               <a:t>Start degree: </a:t>
             </a:r>
             <a:r>
-              <a:rPr lang="zh-CN" altLang="en-US" dirty="0" smtClean="0"/>
+              <a:rPr lang="zh-CN" altLang="en-US" dirty="0"/>
               <a:t>第一个方块开始画的位置</a:t>
             </a:r>
-            <a:endParaRPr lang="en-US" altLang="zh-CN" dirty="0" smtClean="0"/>
-          </a:p>
-          <a:p>
-            <a:r>
-              <a:rPr lang="en-US" altLang="zh-CN" dirty="0" smtClean="0"/>
+            <a:endParaRPr lang="en-US" altLang="zh-CN" dirty="0"/>
+          </a:p>
+          <a:p>
+            <a:r>
+              <a:rPr lang="en-US" altLang="zh-CN" dirty="0"/>
               <a:t>Height: 0.1     </a:t>
             </a:r>
             <a:r>
-              <a:rPr lang="zh-CN" altLang="en-US" dirty="0" smtClean="0"/>
+              <a:rPr lang="zh-CN" altLang="en-US" dirty="0"/>
               <a:t>方块的宽度</a:t>
             </a:r>
-            <a:endParaRPr lang="en-US" altLang="zh-CN" dirty="0" smtClean="0"/>
-          </a:p>
-          <a:p>
-            <a:r>
-              <a:rPr lang="en-US" altLang="zh-CN" dirty="0" err="1" smtClean="0"/>
+            <a:endParaRPr lang="en-US" altLang="zh-CN" dirty="0"/>
+          </a:p>
+          <a:p>
+            <a:r>
+              <a:rPr lang="en-US" altLang="zh-CN" dirty="0" err="1"/>
               <a:t>bg.col</a:t>
             </a:r>
             <a:r>
-              <a:rPr lang="zh-CN" altLang="en-US" dirty="0" smtClean="0"/>
+              <a:rPr lang="zh-CN" altLang="en-US" dirty="0"/>
               <a:t>：</a:t>
             </a:r>
             <a:r>
-              <a:rPr lang="en-US" altLang="zh-CN" dirty="0" smtClean="0"/>
+              <a:rPr lang="en-US" altLang="zh-CN" dirty="0"/>
               <a:t>NA    </a:t>
             </a:r>
             <a:r>
-              <a:rPr lang="zh-CN" altLang="en-US" dirty="0" smtClean="0"/>
+              <a:rPr lang="zh-CN" altLang="en-US" dirty="0"/>
               <a:t>方块内填充颜色</a:t>
             </a:r>
             <a:r>
-              <a:rPr lang="en-US" altLang="zh-CN" dirty="0" smtClean="0"/>
+              <a:rPr lang="en-US" altLang="zh-CN" dirty="0"/>
               <a:t>,NA</a:t>
             </a:r>
             <a:r>
-              <a:rPr lang="zh-CN" altLang="en-US" dirty="0" smtClean="0"/>
+              <a:rPr lang="zh-CN" altLang="en-US" dirty="0"/>
               <a:t>就是不填充</a:t>
             </a:r>
-            <a:endParaRPr lang="en-US" altLang="zh-CN" dirty="0" smtClean="0"/>
-          </a:p>
-          <a:p>
-            <a:r>
-              <a:rPr lang="en-US" altLang="zh-CN" dirty="0" err="1" smtClean="0"/>
+            <a:endParaRPr lang="en-US" altLang="zh-CN" dirty="0"/>
+          </a:p>
+          <a:p>
+            <a:r>
+              <a:rPr lang="en-US" altLang="zh-CN" dirty="0" err="1"/>
               <a:t>Border.type</a:t>
             </a:r>
             <a:r>
-              <a:rPr lang="en-US" altLang="zh-CN" dirty="0" smtClean="0"/>
+              <a:rPr lang="en-US" altLang="zh-CN" dirty="0"/>
               <a:t>: solid </a:t>
             </a:r>
             <a:r>
-              <a:rPr lang="zh-CN" altLang="en-US" dirty="0" smtClean="0"/>
+              <a:rPr lang="zh-CN" altLang="en-US" dirty="0"/>
               <a:t>方块边框线条类型</a:t>
             </a:r>
             <a:r>
-              <a:rPr lang="en-US" altLang="zh-CN" dirty="0" smtClean="0"/>
+              <a:rPr lang="en-US" altLang="zh-CN" dirty="0"/>
               <a:t>(</a:t>
             </a:r>
             <a:r>
-              <a:rPr lang="zh-CN" altLang="en-US" dirty="0" smtClean="0"/>
+              <a:rPr lang="zh-CN" altLang="en-US" dirty="0"/>
               <a:t>实线，虚线等）</a:t>
             </a:r>
             <a:endParaRPr lang="en-US" altLang="zh-CN" dirty="0"/>
@@ -3621,118 +3613,70 @@
           <a:p>
             <a:r>
               <a:rPr lang="en-US" altLang="zh-CN" dirty="0" err="1"/>
-              <a:t>b</a:t>
-            </a:r>
-            <a:r>
-              <a:rPr lang="en-US" altLang="zh-CN" dirty="0" err="1" smtClean="0"/>
-              <a:t>order.col</a:t>
-            </a:r>
-            <a:r>
-              <a:rPr lang="zh-CN" altLang="en-US" dirty="0" smtClean="0"/>
+              <a:t>border.col</a:t>
+            </a:r>
+            <a:r>
+              <a:rPr lang="zh-CN" altLang="en-US" dirty="0"/>
               <a:t>：</a:t>
             </a:r>
             <a:r>
-              <a:rPr lang="en-US" altLang="zh-CN" dirty="0" smtClean="0"/>
+              <a:rPr lang="en-US" altLang="zh-CN" dirty="0"/>
               <a:t>black        </a:t>
             </a:r>
             <a:r>
-              <a:rPr lang="zh-CN" altLang="en-US" dirty="0" smtClean="0"/>
-              <a:t>方块</a:t>
-            </a:r>
-            <a:r>
-              <a:rPr lang="zh-CN" altLang="en-US" dirty="0"/>
-              <a:t>边框</a:t>
-            </a:r>
-            <a:r>
-              <a:rPr lang="zh-CN" altLang="en-US" dirty="0" smtClean="0"/>
-              <a:t>线条</a:t>
-            </a:r>
-            <a:r>
-              <a:rPr lang="zh-CN" altLang="en-US" dirty="0"/>
-              <a:t>颜色</a:t>
-            </a:r>
-            <a:endParaRPr lang="en-US" altLang="zh-CN" dirty="0" smtClean="0"/>
-          </a:p>
-          <a:p>
-            <a:r>
-              <a:rPr lang="en-US" altLang="zh-CN" dirty="0" err="1" smtClean="0"/>
+              <a:rPr lang="zh-CN" altLang="en-US" dirty="0"/>
+              <a:t>方块边框线条颜色</a:t>
+            </a:r>
+            <a:endParaRPr lang="en-US" altLang="zh-CN" dirty="0"/>
+          </a:p>
+          <a:p>
+            <a:r>
+              <a:rPr lang="en-US" altLang="zh-CN" dirty="0" err="1"/>
               <a:t>border.lwd</a:t>
             </a:r>
             <a:r>
               <a:rPr lang="en-US" altLang="zh-CN" dirty="0"/>
-              <a:t>: </a:t>
-            </a:r>
-            <a:r>
-              <a:rPr lang="en-US" altLang="zh-CN" dirty="0" smtClean="0"/>
-              <a:t>1      </a:t>
-            </a:r>
-            <a:r>
-              <a:rPr lang="zh-CN" altLang="en-US" dirty="0" smtClean="0"/>
-              <a:t>方块</a:t>
-            </a:r>
-            <a:r>
-              <a:rPr lang="zh-CN" altLang="en-US" dirty="0"/>
-              <a:t>边框</a:t>
-            </a:r>
-            <a:r>
-              <a:rPr lang="zh-CN" altLang="en-US" dirty="0" smtClean="0"/>
-              <a:t>线条粗细</a:t>
-            </a:r>
-            <a:endParaRPr lang="en-US" altLang="zh-CN" dirty="0" smtClean="0"/>
-          </a:p>
-          <a:p>
-            <a:r>
-              <a:rPr lang="en-US" altLang="zh-CN" dirty="0" smtClean="0"/>
+              <a:t>: 1      </a:t>
+            </a:r>
+            <a:r>
+              <a:rPr lang="zh-CN" altLang="en-US" dirty="0"/>
+              <a:t>方块边框线条粗细</a:t>
+            </a:r>
+            <a:endParaRPr lang="en-US" altLang="zh-CN" dirty="0"/>
+          </a:p>
+          <a:p>
+            <a:r>
+              <a:rPr lang="en-US" altLang="zh-CN" dirty="0"/>
               <a:t>Label</a:t>
             </a:r>
             <a:r>
               <a:rPr lang="zh-CN" altLang="en-US" dirty="0"/>
-              <a:t>弄一个方框可以勾选的  </a:t>
-            </a:r>
-            <a:r>
-              <a:rPr lang="zh-CN" altLang="en-US" dirty="0" smtClean="0"/>
-              <a:t>默认</a:t>
-            </a:r>
-            <a:r>
-              <a:rPr lang="zh-CN" altLang="en-US" dirty="0"/>
-              <a:t>不勾</a:t>
-            </a:r>
-            <a:r>
-              <a:rPr lang="zh-CN" altLang="en-US" dirty="0" smtClean="0"/>
+              <a:t>弄一个方框可以勾选的  默认不勾 </a:t>
+            </a:r>
+            <a:endParaRPr lang="en-US" altLang="zh-CN" dirty="0"/>
+          </a:p>
+          <a:p>
+            <a:r>
+              <a:rPr lang="en-US" altLang="zh-CN" dirty="0"/>
+              <a:t>Direction: clockwise/ </a:t>
+            </a:r>
+            <a:r>
+              <a:rPr lang="zh-CN" altLang="en-US" dirty="0"/>
               <a:t> </a:t>
             </a:r>
-            <a:endParaRPr lang="en-US" altLang="zh-CN" dirty="0" smtClean="0"/>
-          </a:p>
-          <a:p>
-            <a:r>
-              <a:rPr lang="en-US" altLang="zh-CN" dirty="0" smtClean="0"/>
-              <a:t>Direction: clockwise/ </a:t>
-            </a:r>
-            <a:r>
-              <a:rPr lang="zh-CN" altLang="en-US" dirty="0" smtClean="0"/>
-              <a:t> </a:t>
-            </a:r>
-            <a:r>
-              <a:rPr lang="en-US" altLang="zh-CN" dirty="0" smtClean="0"/>
+            <a:r>
+              <a:rPr lang="en-US" altLang="zh-CN" dirty="0"/>
               <a:t>anticlockwise </a:t>
             </a:r>
           </a:p>
           <a:p>
             <a:r>
-              <a:rPr lang="en-US" altLang="zh-CN" dirty="0" smtClean="0"/>
+              <a:rPr lang="en-US" altLang="zh-CN" dirty="0"/>
               <a:t>Scale bar </a:t>
             </a:r>
             <a:r>
-              <a:rPr lang="zh-CN" altLang="en-US" dirty="0" smtClean="0"/>
-              <a:t>弄</a:t>
-            </a:r>
-            <a:r>
-              <a:rPr lang="zh-CN" altLang="en-US" dirty="0"/>
-              <a:t>一个方框可以勾选的  </a:t>
-            </a:r>
-            <a:r>
-              <a:rPr lang="zh-CN" altLang="en-US" dirty="0" smtClean="0"/>
-              <a:t>默认勾上 </a:t>
+              <a:rPr lang="zh-CN" altLang="en-US" dirty="0"/>
+              <a:t>弄一个方框可以勾选的  默认勾上 </a:t>
             </a:r>
             <a:endParaRPr lang="en-US" altLang="zh-CN" dirty="0"/>
           </a:p>
@@ -3761,10 +3705,10 @@
           <a:lstStyle/>
           <a:p>
             <a:r>
-              <a:rPr lang="zh-CN" altLang="en-US" sz="1400" dirty="0" smtClean="0"/>
+              <a:rPr lang="zh-CN" altLang="en-US" sz="1400" dirty="0"/>
               <a:t>这一项可以不需要</a:t>
             </a:r>
-            <a:endParaRPr lang="en-US" altLang="zh-CN" sz="1400" dirty="0" smtClean="0"/>
+            <a:endParaRPr lang="en-US" altLang="zh-CN" sz="1400" dirty="0"/>
           </a:p>
         </p:txBody>
       </p:sp>
@@ -3853,15 +3797,7 @@
           <a:p>
             <a:r>
               <a:rPr lang="zh-CN" altLang="en-US" sz="1600" dirty="0"/>
-              <a:t>是否</a:t>
-            </a:r>
-            <a:r>
-              <a:rPr lang="zh-CN" altLang="en-US" sz="1600" dirty="0" smtClean="0"/>
-              <a:t>显示</a:t>
-            </a:r>
-            <a:r>
-              <a:rPr lang="zh-CN" altLang="en-US" sz="1600" dirty="0"/>
-              <a:t>方块名称的 </a:t>
+              <a:t>是否显示方块名称的 </a:t>
             </a:r>
             <a:endParaRPr lang="en-US" altLang="zh-CN" sz="1600" dirty="0"/>
           </a:p>
@@ -3890,18 +3826,14 @@
           <a:p>
             <a:r>
               <a:rPr lang="zh-CN" altLang="en-US" sz="1600" dirty="0"/>
-              <a:t>是否</a:t>
-            </a:r>
-            <a:r>
-              <a:rPr lang="zh-CN" altLang="en-US" sz="1600" dirty="0" smtClean="0"/>
-              <a:t>显示</a:t>
-            </a:r>
-            <a:r>
-              <a:rPr lang="en-US" altLang="zh-CN" sz="1600" dirty="0" smtClean="0"/>
+              <a:t>是否显示</a:t>
+            </a:r>
+            <a:r>
+              <a:rPr lang="en-US" altLang="zh-CN" sz="1600" dirty="0"/>
               <a:t>scale bar</a:t>
             </a:r>
             <a:r>
-              <a:rPr lang="zh-CN" altLang="en-US" sz="1600" dirty="0" smtClean="0"/>
+              <a:rPr lang="zh-CN" altLang="en-US" sz="1600" dirty="0"/>
               <a:t> </a:t>
             </a:r>
             <a:endParaRPr lang="en-US" altLang="zh-CN" sz="1600" dirty="0"/>
@@ -3930,15 +3862,15 @@
           <a:lstStyle/>
           <a:p>
             <a:r>
-              <a:rPr lang="zh-CN" altLang="en-US" sz="1600" dirty="0" smtClean="0"/>
+              <a:rPr lang="zh-CN" altLang="en-US" sz="1600" dirty="0"/>
               <a:t>顺时针</a:t>
             </a:r>
             <a:r>
-              <a:rPr lang="en-US" altLang="zh-CN" sz="1600" dirty="0" smtClean="0"/>
+              <a:rPr lang="en-US" altLang="zh-CN" sz="1600" dirty="0"/>
               <a:t>/</a:t>
             </a:r>
             <a:r>
-              <a:rPr lang="zh-CN" altLang="en-US" sz="1600" dirty="0" smtClean="0"/>
+              <a:rPr lang="zh-CN" altLang="en-US" sz="1600" dirty="0"/>
               <a:t>逆时针画图</a:t>
             </a:r>
             <a:endParaRPr lang="en-US" altLang="zh-CN" sz="1600" dirty="0"/>
@@ -3998,22 +3930,22 @@
           <a:lstStyle/>
           <a:p>
             <a:r>
-              <a:rPr lang="zh-CN" altLang="en-US" dirty="0" smtClean="0"/>
+              <a:rPr lang="zh-CN" altLang="en-US" dirty="0"/>
               <a:t>参数：</a:t>
             </a:r>
             <a:endParaRPr lang="en-US" altLang="zh-CN" dirty="0"/>
           </a:p>
           <a:p>
             <a:r>
-              <a:rPr lang="en-US" altLang="zh-CN" dirty="0" smtClean="0"/>
+              <a:rPr lang="en-US" altLang="zh-CN" dirty="0"/>
               <a:t>type</a:t>
             </a:r>
             <a:r>
-              <a:rPr lang="zh-CN" altLang="en-US" dirty="0" smtClean="0"/>
+              <a:rPr lang="zh-CN" altLang="en-US" dirty="0"/>
               <a:t>：</a:t>
             </a:r>
             <a:r>
-              <a:rPr lang="en-US" altLang="zh-CN" dirty="0" smtClean="0"/>
+              <a:rPr lang="en-US" altLang="zh-CN" dirty="0"/>
               <a:t>outside / inside / inner</a:t>
             </a:r>
           </a:p>
@@ -4046,20 +3978,16 @@
               <a:t>category file</a:t>
             </a:r>
             <a:r>
-              <a:rPr lang="zh-CN" altLang="en-US" dirty="0" smtClean="0"/>
+              <a:rPr lang="zh-CN" altLang="en-US" dirty="0"/>
               <a:t>相关</a:t>
             </a:r>
             <a:r>
-              <a:rPr lang="en-US" altLang="zh-CN" dirty="0" smtClean="0"/>
+              <a:rPr lang="en-US" altLang="zh-CN" dirty="0"/>
               <a:t>(optional) </a:t>
             </a:r>
             <a:r>
-              <a:rPr lang="zh-CN" altLang="en-US" dirty="0" smtClean="0"/>
-              <a:t>该</a:t>
-            </a:r>
-            <a:r>
-              <a:rPr lang="zh-CN" altLang="en-US" dirty="0"/>
-              <a:t>文件没有也可以画图</a:t>
+              <a:rPr lang="zh-CN" altLang="en-US" dirty="0"/>
+              <a:t>该文件没有也可以画图</a:t>
             </a:r>
           </a:p>
         </p:txBody>
@@ -4087,10 +4015,9 @@
           <a:lstStyle/>
           <a:p>
             <a:r>
-              <a:rPr lang="zh-CN" altLang="en-US" dirty="0" smtClean="0"/>
+              <a:rPr lang="zh-CN" altLang="en-US" dirty="0"/>
               <a:t>数据格式</a:t>
             </a:r>
-            <a:endParaRPr lang="zh-CN" altLang="en-US" dirty="0"/>
           </a:p>
         </p:txBody>
       </p:sp>
@@ -4182,13 +4109,8 @@
           <a:p>
             <a:r>
               <a:rPr lang="zh-CN" altLang="en-US" sz="1400" dirty="0"/>
-              <a:t>弄</a:t>
-            </a:r>
-            <a:r>
-              <a:rPr lang="zh-CN" altLang="en-US" sz="1400" dirty="0" smtClean="0"/>
-              <a:t>成下拉菜单那种 有 这么几个选项  默认是第一个</a:t>
-            </a:r>
-            <a:endParaRPr lang="zh-CN" altLang="en-US" sz="1400" dirty="0"/>
+              <a:t>弄成下拉菜单那种 有 这么几个选项  默认是第一个</a:t>
+            </a:r>
           </a:p>
         </p:txBody>
       </p:sp>
@@ -4215,86 +4137,82 @@
           <a:lstStyle/>
           <a:p>
             <a:r>
-              <a:rPr lang="zh-CN" altLang="en-US" dirty="0" smtClean="0"/>
+              <a:rPr lang="zh-CN" altLang="en-US" dirty="0"/>
               <a:t>当</a:t>
             </a:r>
             <a:r>
-              <a:rPr lang="en-US" altLang="zh-CN" dirty="0" smtClean="0"/>
+              <a:rPr lang="en-US" altLang="zh-CN" dirty="0"/>
               <a:t>type</a:t>
             </a:r>
             <a:r>
-              <a:rPr lang="zh-CN" altLang="en-US" dirty="0" smtClean="0"/>
+              <a:rPr lang="zh-CN" altLang="en-US" dirty="0"/>
               <a:t>为</a:t>
             </a:r>
             <a:r>
-              <a:rPr lang="en-US" altLang="zh-CN" dirty="0" smtClean="0"/>
+              <a:rPr lang="en-US" altLang="zh-CN" dirty="0"/>
               <a:t>outside</a:t>
             </a:r>
             <a:r>
-              <a:rPr lang="zh-CN" altLang="en-US" dirty="0" smtClean="0"/>
+              <a:rPr lang="zh-CN" altLang="en-US" dirty="0"/>
               <a:t>或</a:t>
             </a:r>
             <a:r>
-              <a:rPr lang="en-US" altLang="zh-CN" dirty="0" smtClean="0"/>
+              <a:rPr lang="en-US" altLang="zh-CN" dirty="0"/>
               <a:t>inside</a:t>
             </a:r>
             <a:r>
-              <a:rPr lang="zh-CN" altLang="en-US" dirty="0" smtClean="0"/>
+              <a:rPr lang="zh-CN" altLang="en-US" dirty="0"/>
               <a:t>的时候</a:t>
             </a:r>
-            <a:endParaRPr lang="en-US" altLang="zh-CN" dirty="0" smtClean="0"/>
-          </a:p>
-          <a:p>
-            <a:r>
-              <a:rPr lang="zh-CN" altLang="en-US" dirty="0" smtClean="0"/>
+            <a:endParaRPr lang="en-US" altLang="zh-CN" dirty="0"/>
+          </a:p>
+          <a:p>
+            <a:r>
+              <a:rPr lang="zh-CN" altLang="en-US" dirty="0"/>
               <a:t>参数为：</a:t>
             </a:r>
-            <a:endParaRPr lang="en-US" altLang="zh-CN" dirty="0" smtClean="0"/>
-          </a:p>
-          <a:p>
-            <a:r>
-              <a:rPr lang="en-US" altLang="zh-CN" dirty="0" smtClean="0"/>
+            <a:endParaRPr lang="en-US" altLang="zh-CN" dirty="0"/>
+          </a:p>
+          <a:p>
+            <a:r>
+              <a:rPr lang="en-US" altLang="zh-CN" dirty="0"/>
               <a:t>Height: 0.2         category</a:t>
             </a:r>
             <a:r>
-              <a:rPr lang="zh-CN" altLang="en-US" dirty="0" smtClean="0"/>
+              <a:rPr lang="zh-CN" altLang="en-US" dirty="0"/>
               <a:t>层的高度</a:t>
             </a:r>
-            <a:endParaRPr lang="en-US" altLang="zh-CN" dirty="0" smtClean="0"/>
-          </a:p>
-          <a:p>
-            <a:r>
-              <a:rPr lang="en-US" altLang="zh-CN" dirty="0" smtClean="0"/>
+            <a:endParaRPr lang="en-US" altLang="zh-CN" dirty="0"/>
+          </a:p>
+          <a:p>
+            <a:r>
+              <a:rPr lang="en-US" altLang="zh-CN" dirty="0"/>
               <a:t>col: gray             category</a:t>
             </a:r>
             <a:r>
               <a:rPr lang="zh-CN" altLang="en-US" dirty="0"/>
-              <a:t>层</a:t>
-            </a:r>
-            <a:r>
-              <a:rPr lang="zh-CN" altLang="en-US" dirty="0" smtClean="0"/>
-              <a:t>的填充颜色</a:t>
-            </a:r>
-            <a:endParaRPr lang="en-US" altLang="zh-CN" dirty="0" smtClean="0"/>
-          </a:p>
-          <a:p>
-            <a:r>
-              <a:rPr lang="en-US" altLang="zh-CN" dirty="0" smtClean="0"/>
+              <a:t>层的填充颜色</a:t>
+            </a:r>
+            <a:endParaRPr lang="en-US" altLang="zh-CN" dirty="0"/>
+          </a:p>
+          <a:p>
+            <a:r>
+              <a:rPr lang="en-US" altLang="zh-CN" dirty="0"/>
               <a:t>Label: TRUE          </a:t>
             </a:r>
             <a:r>
-              <a:rPr lang="zh-CN" altLang="en-US" dirty="0" smtClean="0"/>
+              <a:rPr lang="zh-CN" altLang="en-US" dirty="0"/>
               <a:t>是否写上</a:t>
             </a:r>
             <a:r>
-              <a:rPr lang="en-US" altLang="zh-CN" dirty="0" smtClean="0"/>
+              <a:rPr lang="en-US" altLang="zh-CN" dirty="0"/>
               <a:t>category</a:t>
             </a:r>
             <a:r>
-              <a:rPr lang="zh-CN" altLang="en-US" dirty="0" smtClean="0"/>
+              <a:rPr lang="zh-CN" altLang="en-US" dirty="0"/>
               <a:t>对应的文字</a:t>
             </a:r>
-            <a:endParaRPr lang="en-US" altLang="zh-CN" dirty="0" smtClean="0"/>
+            <a:endParaRPr lang="en-US" altLang="zh-CN" dirty="0"/>
           </a:p>
         </p:txBody>
       </p:sp>
@@ -4321,37 +4239,37 @@
           <a:lstStyle/>
           <a:p>
             <a:r>
-              <a:rPr lang="zh-CN" altLang="en-US" dirty="0" smtClean="0"/>
+              <a:rPr lang="zh-CN" altLang="en-US" dirty="0"/>
               <a:t>当</a:t>
             </a:r>
             <a:r>
-              <a:rPr lang="en-US" altLang="zh-CN" dirty="0" smtClean="0"/>
+              <a:rPr lang="en-US" altLang="zh-CN" dirty="0"/>
               <a:t>type</a:t>
             </a:r>
             <a:r>
-              <a:rPr lang="zh-CN" altLang="en-US" dirty="0" smtClean="0"/>
+              <a:rPr lang="zh-CN" altLang="en-US" dirty="0"/>
               <a:t>为</a:t>
             </a:r>
             <a:r>
-              <a:rPr lang="en-US" altLang="zh-CN" dirty="0" smtClean="0"/>
+              <a:rPr lang="en-US" altLang="zh-CN" dirty="0"/>
               <a:t>inner</a:t>
             </a:r>
             <a:r>
-              <a:rPr lang="zh-CN" altLang="en-US" dirty="0" smtClean="0"/>
+              <a:rPr lang="zh-CN" altLang="en-US" dirty="0"/>
               <a:t>的时候</a:t>
             </a:r>
-            <a:endParaRPr lang="en-US" altLang="zh-CN" dirty="0" smtClean="0"/>
-          </a:p>
-          <a:p>
-            <a:r>
-              <a:rPr lang="zh-CN" altLang="en-US" dirty="0" smtClean="0"/>
+            <a:endParaRPr lang="en-US" altLang="zh-CN" dirty="0"/>
+          </a:p>
+          <a:p>
+            <a:r>
+              <a:rPr lang="zh-CN" altLang="en-US" dirty="0"/>
               <a:t>参数为：</a:t>
             </a:r>
-            <a:endParaRPr lang="en-US" altLang="zh-CN" dirty="0" smtClean="0"/>
-          </a:p>
-          <a:p>
-            <a:r>
-              <a:rPr lang="en-US" altLang="zh-CN" dirty="0" smtClean="0"/>
+            <a:endParaRPr lang="en-US" altLang="zh-CN" dirty="0"/>
+          </a:p>
+          <a:p>
+            <a:r>
+              <a:rPr lang="en-US" altLang="zh-CN" dirty="0"/>
               <a:t>Label: TRUE</a:t>
             </a:r>
           </a:p>
@@ -4508,46 +4426,37 @@
           <a:lstStyle/>
           <a:p>
             <a:r>
-              <a:rPr lang="en-US" altLang="zh-CN" sz="1400" dirty="0" smtClean="0"/>
+              <a:rPr lang="en-US" altLang="zh-CN" sz="1400" dirty="0"/>
               <a:t>Type</a:t>
             </a:r>
             <a:r>
-              <a:rPr lang="zh-CN" altLang="en-US" sz="1400" dirty="0" smtClean="0"/>
+              <a:rPr lang="zh-CN" altLang="en-US" sz="1400" dirty="0"/>
               <a:t>为</a:t>
             </a:r>
             <a:r>
-              <a:rPr lang="en-US" altLang="zh-CN" sz="1400" dirty="0" smtClean="0"/>
+              <a:rPr lang="en-US" altLang="zh-CN" sz="1400" dirty="0"/>
               <a:t>inner </a:t>
             </a:r>
             <a:r>
-              <a:rPr lang="zh-CN" altLang="en-US" sz="1400" dirty="0" smtClean="0"/>
+              <a:rPr lang="zh-CN" altLang="en-US" sz="1400" dirty="0"/>
               <a:t>就把</a:t>
             </a:r>
             <a:r>
-              <a:rPr lang="en-US" altLang="zh-CN" sz="1400" dirty="0" smtClean="0"/>
+              <a:rPr lang="en-US" altLang="zh-CN" sz="1400" dirty="0"/>
               <a:t>backbone</a:t>
             </a:r>
             <a:r>
-              <a:rPr lang="zh-CN" altLang="en-US" sz="1400" dirty="0" smtClean="0"/>
+              <a:rPr lang="zh-CN" altLang="en-US" sz="1400" dirty="0"/>
               <a:t>里面方框填充颜色根据</a:t>
             </a:r>
             <a:r>
-              <a:rPr lang="en-US" altLang="zh-CN" sz="1400" dirty="0" err="1" smtClean="0"/>
+              <a:rPr lang="en-US" altLang="zh-CN" sz="1400" dirty="0" err="1"/>
               <a:t>categoty</a:t>
             </a:r>
             <a:r>
-              <a:rPr lang="zh-CN" altLang="en-US" sz="1400" dirty="0" smtClean="0"/>
-              <a:t>的种类给</a:t>
-            </a:r>
-            <a:r>
               <a:rPr lang="zh-CN" altLang="en-US" sz="1400" dirty="0"/>
-              <a:t>定义</a:t>
-            </a:r>
-            <a:r>
-              <a:rPr lang="zh-CN" altLang="en-US" sz="1400" dirty="0" smtClean="0"/>
-              <a:t>上不同颜色 如右图</a:t>
-            </a:r>
-            <a:endParaRPr lang="zh-CN" altLang="en-US" sz="1400" dirty="0"/>
+              <a:t>的种类给定义上不同颜色 如右图</a:t>
+            </a:r>
           </a:p>
         </p:txBody>
       </p:sp>
@@ -4668,31 +4577,23 @@
           <a:lstStyle/>
           <a:p>
             <a:r>
-              <a:rPr lang="zh-CN" altLang="en-US" dirty="0" smtClean="0"/>
+              <a:rPr lang="zh-CN" altLang="en-US" dirty="0"/>
               <a:t>参数：</a:t>
             </a:r>
             <a:endParaRPr lang="en-US" altLang="zh-CN" dirty="0"/>
           </a:p>
           <a:p>
             <a:r>
-              <a:rPr lang="en-US" altLang="zh-CN" dirty="0" smtClean="0"/>
+              <a:rPr lang="en-US" altLang="zh-CN" dirty="0"/>
               <a:t>type</a:t>
             </a:r>
             <a:r>
-              <a:rPr lang="zh-CN" altLang="en-US" dirty="0" smtClean="0"/>
+              <a:rPr lang="zh-CN" altLang="en-US" dirty="0"/>
               <a:t>：</a:t>
             </a:r>
             <a:r>
-              <a:rPr lang="en-US" altLang="zh-CN" dirty="0" smtClean="0"/>
-              <a:t>arrow/ </a:t>
-            </a:r>
-            <a:r>
-              <a:rPr lang="en-US" altLang="zh-CN" dirty="0"/>
-              <a:t>tile </a:t>
-            </a:r>
-            <a:r>
-              <a:rPr lang="en-US" altLang="zh-CN" dirty="0" smtClean="0"/>
-              <a:t>/ point/line/bar/</a:t>
+              <a:rPr lang="en-US" altLang="zh-CN" dirty="0"/>
+              <a:t>arrow/ tile / point/line/bar/</a:t>
             </a:r>
           </a:p>
         </p:txBody>
@@ -4720,11 +4621,11 @@
           <a:lstStyle/>
           <a:p>
             <a:r>
-              <a:rPr lang="en-US" altLang="zh-CN" dirty="0" smtClean="0"/>
+              <a:rPr lang="en-US" altLang="zh-CN" dirty="0"/>
               <a:t>Track arrow file</a:t>
             </a:r>
             <a:r>
-              <a:rPr lang="zh-CN" altLang="en-US" dirty="0" smtClean="0"/>
+              <a:rPr lang="zh-CN" altLang="en-US" dirty="0"/>
               <a:t>相关</a:t>
             </a:r>
             <a:r>
@@ -4733,23 +4634,7 @@
             </a:r>
             <a:r>
               <a:rPr lang="zh-CN" altLang="en-US" dirty="0"/>
-              <a:t>该文件</a:t>
-            </a:r>
-            <a:r>
-              <a:rPr lang="zh-CN" altLang="en-US" dirty="0" smtClean="0"/>
-              <a:t>没有</a:t>
-            </a:r>
-            <a:r>
-              <a:rPr lang="zh-CN" altLang="en-US" dirty="0"/>
-              <a:t>也</a:t>
-            </a:r>
-            <a:r>
-              <a:rPr lang="zh-CN" altLang="en-US" dirty="0" smtClean="0"/>
-              <a:t>可以</a:t>
-            </a:r>
-            <a:r>
-              <a:rPr lang="zh-CN" altLang="en-US" dirty="0"/>
-              <a:t>画图</a:t>
+              <a:t>该文件没有也可以画图</a:t>
             </a:r>
           </a:p>
         </p:txBody>
@@ -4777,10 +4662,9 @@
           <a:lstStyle/>
           <a:p>
             <a:r>
-              <a:rPr lang="zh-CN" altLang="en-US" dirty="0" smtClean="0"/>
+              <a:rPr lang="zh-CN" altLang="en-US" dirty="0"/>
               <a:t>数据格式</a:t>
             </a:r>
-            <a:endParaRPr lang="zh-CN" altLang="en-US" dirty="0"/>
           </a:p>
         </p:txBody>
       </p:sp>
@@ -4808,13 +4692,8 @@
           <a:p>
             <a:r>
               <a:rPr lang="zh-CN" altLang="en-US" sz="1400" dirty="0"/>
-              <a:t>弄</a:t>
-            </a:r>
-            <a:r>
-              <a:rPr lang="zh-CN" altLang="en-US" sz="1400" dirty="0" smtClean="0"/>
-              <a:t>成下拉菜单那种 有 这么几个选项  默认是第一个</a:t>
-            </a:r>
-            <a:endParaRPr lang="zh-CN" altLang="en-US" sz="1400" dirty="0"/>
+              <a:t>弄成下拉菜单那种 有 这么几个选项  默认是第一个</a:t>
+            </a:r>
           </a:p>
         </p:txBody>
       </p:sp>
@@ -4841,78 +4720,78 @@
           <a:lstStyle/>
           <a:p>
             <a:r>
-              <a:rPr lang="zh-CN" altLang="en-US" dirty="0" smtClean="0"/>
+              <a:rPr lang="zh-CN" altLang="en-US" dirty="0"/>
               <a:t>当</a:t>
             </a:r>
             <a:r>
-              <a:rPr lang="en-US" altLang="zh-CN" dirty="0" smtClean="0"/>
+              <a:rPr lang="en-US" altLang="zh-CN" dirty="0"/>
               <a:t>type</a:t>
             </a:r>
             <a:r>
-              <a:rPr lang="zh-CN" altLang="en-US" dirty="0" smtClean="0"/>
+              <a:rPr lang="zh-CN" altLang="en-US" dirty="0"/>
               <a:t>为</a:t>
             </a:r>
             <a:r>
-              <a:rPr lang="en-US" altLang="zh-CN" dirty="0" smtClean="0"/>
+              <a:rPr lang="en-US" altLang="zh-CN" dirty="0"/>
               <a:t>arrow</a:t>
             </a:r>
             <a:r>
-              <a:rPr lang="zh-CN" altLang="en-US" dirty="0" smtClean="0"/>
+              <a:rPr lang="zh-CN" altLang="en-US" dirty="0"/>
               <a:t>时</a:t>
             </a:r>
-            <a:endParaRPr lang="en-US" altLang="zh-CN" dirty="0" smtClean="0"/>
-          </a:p>
-          <a:p>
-            <a:r>
-              <a:rPr lang="zh-CN" altLang="en-US" dirty="0" smtClean="0"/>
+            <a:endParaRPr lang="en-US" altLang="zh-CN" dirty="0"/>
+          </a:p>
+          <a:p>
+            <a:r>
+              <a:rPr lang="zh-CN" altLang="en-US" dirty="0"/>
               <a:t>参数为：</a:t>
             </a:r>
-            <a:endParaRPr lang="en-US" altLang="zh-CN" dirty="0" smtClean="0"/>
-          </a:p>
-          <a:p>
-            <a:r>
-              <a:rPr lang="en-US" altLang="zh-CN" dirty="0" err="1" smtClean="0"/>
+            <a:endParaRPr lang="en-US" altLang="zh-CN" dirty="0"/>
+          </a:p>
+          <a:p>
+            <a:r>
+              <a:rPr lang="en-US" altLang="zh-CN" dirty="0" err="1"/>
               <a:t>Head.width</a:t>
             </a:r>
             <a:r>
-              <a:rPr lang="en-US" altLang="zh-CN" dirty="0" smtClean="0"/>
+              <a:rPr lang="en-US" altLang="zh-CN" dirty="0"/>
               <a:t>: 0.6         </a:t>
             </a:r>
           </a:p>
           <a:p>
             <a:r>
-              <a:rPr lang="en-US" altLang="zh-CN" dirty="0" err="1" smtClean="0"/>
+              <a:rPr lang="en-US" altLang="zh-CN" dirty="0" err="1"/>
               <a:t>Head.ratio</a:t>
             </a:r>
             <a:r>
-              <a:rPr lang="en-US" altLang="zh-CN" dirty="0" smtClean="0"/>
+              <a:rPr lang="en-US" altLang="zh-CN" dirty="0"/>
               <a:t>: 0.2     </a:t>
             </a:r>
             <a:r>
-              <a:rPr lang="zh-CN" altLang="en-US" dirty="0" smtClean="0"/>
+              <a:rPr lang="zh-CN" altLang="en-US" dirty="0"/>
               <a:t>头尾比例</a:t>
             </a:r>
-            <a:endParaRPr lang="en-US" altLang="zh-CN" dirty="0" smtClean="0"/>
-          </a:p>
-          <a:p>
-            <a:r>
-              <a:rPr lang="en-US" altLang="zh-CN" dirty="0" err="1" smtClean="0"/>
+            <a:endParaRPr lang="en-US" altLang="zh-CN" dirty="0"/>
+          </a:p>
+          <a:p>
+            <a:r>
+              <a:rPr lang="en-US" altLang="zh-CN" dirty="0" err="1"/>
               <a:t>Tail.width</a:t>
             </a:r>
             <a:r>
-              <a:rPr lang="en-US" altLang="zh-CN" dirty="0" smtClean="0"/>
+              <a:rPr lang="en-US" altLang="zh-CN" dirty="0"/>
               <a:t>: 0.6</a:t>
             </a:r>
           </a:p>
           <a:p>
             <a:r>
-              <a:rPr lang="en-US" altLang="zh-CN" dirty="0" smtClean="0"/>
+              <a:rPr lang="en-US" altLang="zh-CN" dirty="0"/>
               <a:t>Direction: clockwise</a:t>
             </a:r>
           </a:p>
           <a:p>
             <a:r>
-              <a:rPr lang="en-US" altLang="zh-CN" dirty="0" smtClean="0"/>
+              <a:rPr lang="en-US" altLang="zh-CN" dirty="0"/>
               <a:t>col: gray</a:t>
             </a:r>
           </a:p>
@@ -4941,18 +4820,18 @@
           <a:lstStyle/>
           <a:p>
             <a:r>
-              <a:rPr lang="zh-CN" altLang="en-US" dirty="0" smtClean="0"/>
+              <a:rPr lang="zh-CN" altLang="en-US" dirty="0"/>
               <a:t>其他</a:t>
             </a:r>
             <a:r>
-              <a:rPr lang="en-US" altLang="zh-CN" dirty="0" smtClean="0"/>
+              <a:rPr lang="en-US" altLang="zh-CN" dirty="0"/>
               <a:t>type</a:t>
             </a:r>
             <a:r>
-              <a:rPr lang="zh-CN" altLang="en-US" dirty="0" smtClean="0"/>
+              <a:rPr lang="zh-CN" altLang="en-US" dirty="0"/>
               <a:t>先不管吧</a:t>
             </a:r>
-            <a:endParaRPr lang="en-US" altLang="zh-CN" dirty="0" smtClean="0"/>
+            <a:endParaRPr lang="en-US" altLang="zh-CN" dirty="0"/>
           </a:p>
         </p:txBody>
       </p:sp>
@@ -5043,26 +4922,26 @@
           <a:lstStyle/>
           <a:p>
             <a:r>
-              <a:rPr lang="zh-CN" altLang="en-US" dirty="0" smtClean="0"/>
+              <a:rPr lang="zh-CN" altLang="en-US" dirty="0"/>
               <a:t>当</a:t>
             </a:r>
             <a:r>
-              <a:rPr lang="en-US" altLang="zh-CN" dirty="0" smtClean="0"/>
+              <a:rPr lang="en-US" altLang="zh-CN" dirty="0"/>
               <a:t>type</a:t>
             </a:r>
             <a:r>
-              <a:rPr lang="zh-CN" altLang="en-US" dirty="0" smtClean="0"/>
+              <a:rPr lang="zh-CN" altLang="en-US" dirty="0"/>
               <a:t>为</a:t>
             </a:r>
             <a:r>
-              <a:rPr lang="en-US" altLang="zh-CN" dirty="0" smtClean="0"/>
+              <a:rPr lang="en-US" altLang="zh-CN" dirty="0"/>
               <a:t>tile</a:t>
             </a:r>
             <a:r>
-              <a:rPr lang="zh-CN" altLang="en-US" dirty="0" smtClean="0"/>
+              <a:rPr lang="zh-CN" altLang="en-US" dirty="0"/>
               <a:t>时</a:t>
             </a:r>
-            <a:endParaRPr lang="en-US" altLang="zh-CN" dirty="0" smtClean="0"/>
+            <a:endParaRPr lang="en-US" altLang="zh-CN" dirty="0"/>
           </a:p>
           <a:p>
             <a:r>
@@ -5082,32 +4961,32 @@
               <a:t>那列不需要</a:t>
             </a:r>
             <a:r>
-              <a:rPr lang="en-US" altLang="zh-CN" dirty="0" smtClean="0"/>
+              <a:rPr lang="en-US" altLang="zh-CN" dirty="0"/>
               <a:t>)</a:t>
             </a:r>
           </a:p>
           <a:p>
             <a:r>
-              <a:rPr lang="zh-CN" altLang="en-US" dirty="0" smtClean="0"/>
+              <a:rPr lang="zh-CN" altLang="en-US" dirty="0"/>
               <a:t>参数为：</a:t>
             </a:r>
-            <a:endParaRPr lang="en-US" altLang="zh-CN" dirty="0" smtClean="0"/>
-          </a:p>
-          <a:p>
-            <a:r>
-              <a:rPr lang="en-US" altLang="zh-CN" dirty="0" smtClean="0"/>
+            <a:endParaRPr lang="en-US" altLang="zh-CN" dirty="0"/>
+          </a:p>
+          <a:p>
+            <a:r>
+              <a:rPr lang="en-US" altLang="zh-CN" dirty="0"/>
               <a:t>width: 0.6   </a:t>
             </a:r>
           </a:p>
           <a:p>
             <a:r>
-              <a:rPr lang="en-US" altLang="zh-CN" dirty="0" smtClean="0"/>
+              <a:rPr lang="en-US" altLang="zh-CN" dirty="0"/>
               <a:t>bottom: 0.2</a:t>
             </a:r>
           </a:p>
           <a:p>
             <a:r>
-              <a:rPr lang="en-US" altLang="zh-CN" dirty="0" smtClean="0"/>
+              <a:rPr lang="en-US" altLang="zh-CN" dirty="0"/>
               <a:t>col: gray</a:t>
             </a:r>
           </a:p>
@@ -5137,17 +5016,458 @@
           <a:p>
             <a:r>
               <a:rPr lang="en-US" altLang="zh-CN" dirty="0"/>
-              <a:t>Track arrow</a:t>
-            </a:r>
-            <a:r>
-              <a:rPr lang="en-US" altLang="zh-CN" dirty="0" smtClean="0"/>
-              <a:t> file</a:t>
-            </a:r>
-            <a:r>
-              <a:rPr lang="zh-CN" altLang="en-US" dirty="0" smtClean="0"/>
+              <a:t>Track arrow file</a:t>
+            </a:r>
+            <a:r>
+              <a:rPr lang="zh-CN" altLang="en-US" dirty="0"/>
               <a:t>可以上传多个文件 每个文件单独设置参数</a:t>
             </a:r>
+          </a:p>
+        </p:txBody>
+      </p:sp>
+      <p:sp>
+        <p:nvSpPr>
+          <p:cNvPr id="3" name="等腰三角形 2">
+            <a:extLst>
+              <a:ext uri="{FF2B5EF4-FFF2-40B4-BE49-F238E27FC236}">
+                <a16:creationId xmlns:a16="http://schemas.microsoft.com/office/drawing/2014/main" id="{C5F4F813-30E1-4237-89B1-C00468EAEC0A}"/>
+              </a:ext>
+            </a:extLst>
+          </p:cNvPr>
+          <p:cNvSpPr/>
+          <p:nvPr/>
+        </p:nvSpPr>
+        <p:spPr>
+          <a:xfrm rot="16200000">
+            <a:off x="4572000" y="4509120"/>
+            <a:ext cx="1440160" cy="576064"/>
+          </a:xfrm>
+          <a:prstGeom prst="triangle">
+            <a:avLst/>
+          </a:prstGeom>
+          <a:solidFill>
+            <a:schemeClr val="bg1">
+              <a:lumMod val="75000"/>
+            </a:schemeClr>
+          </a:solidFill>
+          <a:ln>
+            <a:solidFill>
+              <a:schemeClr val="bg1">
+                <a:lumMod val="75000"/>
+              </a:schemeClr>
+            </a:solidFill>
+          </a:ln>
+        </p:spPr>
+        <p:style>
+          <a:lnRef idx="2">
+            <a:schemeClr val="accent1">
+              <a:shade val="50000"/>
+            </a:schemeClr>
+          </a:lnRef>
+          <a:fillRef idx="1">
+            <a:schemeClr val="accent1"/>
+          </a:fillRef>
+          <a:effectRef idx="0">
+            <a:schemeClr val="accent1"/>
+          </a:effectRef>
+          <a:fontRef idx="minor">
+            <a:schemeClr val="lt1"/>
+          </a:fontRef>
+        </p:style>
+        <p:txBody>
+          <a:bodyPr rtlCol="0" anchor="ctr"/>
+          <a:lstStyle/>
+          <a:p>
+            <a:pPr algn="ctr"/>
+            <a:endParaRPr lang="zh-CN" altLang="en-US"/>
+          </a:p>
+        </p:txBody>
+      </p:sp>
+      <p:cxnSp>
+        <p:nvCxnSpPr>
+          <p:cNvPr id="7" name="直接连接符 6">
+            <a:extLst>
+              <a:ext uri="{FF2B5EF4-FFF2-40B4-BE49-F238E27FC236}">
+                <a16:creationId xmlns:a16="http://schemas.microsoft.com/office/drawing/2014/main" id="{11D36362-3EEA-4596-B174-5938356F6BBF}"/>
+              </a:ext>
+            </a:extLst>
+          </p:cNvPr>
+          <p:cNvCxnSpPr/>
+          <p:nvPr/>
+        </p:nvCxnSpPr>
+        <p:spPr>
+          <a:xfrm>
+            <a:off x="6516216" y="4077071"/>
+            <a:ext cx="1872208" cy="0"/>
+          </a:xfrm>
+          <a:prstGeom prst="line">
+            <a:avLst/>
+          </a:prstGeom>
+        </p:spPr>
+        <p:style>
+          <a:lnRef idx="1">
+            <a:schemeClr val="accent1"/>
+          </a:lnRef>
+          <a:fillRef idx="0">
+            <a:schemeClr val="accent1"/>
+          </a:fillRef>
+          <a:effectRef idx="0">
+            <a:schemeClr val="accent1"/>
+          </a:effectRef>
+          <a:fontRef idx="minor">
+            <a:schemeClr val="tx1"/>
+          </a:fontRef>
+        </p:style>
+      </p:cxnSp>
+      <p:cxnSp>
+        <p:nvCxnSpPr>
+          <p:cNvPr id="9" name="直接连接符 8">
+            <a:extLst>
+              <a:ext uri="{FF2B5EF4-FFF2-40B4-BE49-F238E27FC236}">
+                <a16:creationId xmlns:a16="http://schemas.microsoft.com/office/drawing/2014/main" id="{91ADC094-4F30-4777-BDE1-A2C22F61B936}"/>
+              </a:ext>
+            </a:extLst>
+          </p:cNvPr>
+          <p:cNvCxnSpPr/>
+          <p:nvPr/>
+        </p:nvCxnSpPr>
+        <p:spPr>
+          <a:xfrm>
+            <a:off x="6516216" y="5517232"/>
+            <a:ext cx="1872208" cy="0"/>
+          </a:xfrm>
+          <a:prstGeom prst="line">
+            <a:avLst/>
+          </a:prstGeom>
+        </p:spPr>
+        <p:style>
+          <a:lnRef idx="1">
+            <a:schemeClr val="accent1"/>
+          </a:lnRef>
+          <a:fillRef idx="0">
+            <a:schemeClr val="accent1"/>
+          </a:fillRef>
+          <a:effectRef idx="0">
+            <a:schemeClr val="accent1"/>
+          </a:effectRef>
+          <a:fontRef idx="minor">
+            <a:schemeClr val="tx1"/>
+          </a:fontRef>
+        </p:style>
+      </p:cxnSp>
+      <p:sp>
+        <p:nvSpPr>
+          <p:cNvPr id="11" name="文本框 10">
+            <a:extLst>
+              <a:ext uri="{FF2B5EF4-FFF2-40B4-BE49-F238E27FC236}">
+                <a16:creationId xmlns:a16="http://schemas.microsoft.com/office/drawing/2014/main" id="{94AD3E1C-13E0-481E-8FB2-68101933D410}"/>
+              </a:ext>
+            </a:extLst>
+          </p:cNvPr>
+          <p:cNvSpPr txBox="1"/>
+          <p:nvPr/>
+        </p:nvSpPr>
+        <p:spPr>
+          <a:xfrm>
+            <a:off x="7812360" y="4797151"/>
+            <a:ext cx="1083886" cy="369332"/>
+          </a:xfrm>
+          <a:prstGeom prst="rect">
+            <a:avLst/>
+          </a:prstGeom>
+          <a:noFill/>
+        </p:spPr>
+        <p:txBody>
+          <a:bodyPr wrap="none" rtlCol="0">
+            <a:spAutoFit/>
+          </a:bodyPr>
+          <a:lstStyle/>
+          <a:p>
+            <a:r>
+              <a:rPr lang="en-US" altLang="zh-CN" dirty="0" err="1"/>
+              <a:t>Tail.width</a:t>
+            </a:r>
             <a:endParaRPr lang="zh-CN" altLang="en-US" dirty="0"/>
+          </a:p>
+        </p:txBody>
+      </p:sp>
+      <p:cxnSp>
+        <p:nvCxnSpPr>
+          <p:cNvPr id="16" name="直接连接符 15">
+            <a:extLst>
+              <a:ext uri="{FF2B5EF4-FFF2-40B4-BE49-F238E27FC236}">
+                <a16:creationId xmlns:a16="http://schemas.microsoft.com/office/drawing/2014/main" id="{7AEAC814-733B-4B09-AC2C-D7BFCB431443}"/>
+              </a:ext>
+            </a:extLst>
+          </p:cNvPr>
+          <p:cNvCxnSpPr>
+            <a:stCxn id="3" idx="4"/>
+          </p:cNvCxnSpPr>
+          <p:nvPr/>
+        </p:nvCxnSpPr>
+        <p:spPr>
+          <a:xfrm flipH="1" flipV="1">
+            <a:off x="3275856" y="4077071"/>
+            <a:ext cx="2304256" cy="1"/>
+          </a:xfrm>
+          <a:prstGeom prst="line">
+            <a:avLst/>
+          </a:prstGeom>
+        </p:spPr>
+        <p:style>
+          <a:lnRef idx="1">
+            <a:schemeClr val="accent1"/>
+          </a:lnRef>
+          <a:fillRef idx="0">
+            <a:schemeClr val="accent1"/>
+          </a:fillRef>
+          <a:effectRef idx="0">
+            <a:schemeClr val="accent1"/>
+          </a:effectRef>
+          <a:fontRef idx="minor">
+            <a:schemeClr val="tx1"/>
+          </a:fontRef>
+        </p:style>
+      </p:cxnSp>
+      <p:cxnSp>
+        <p:nvCxnSpPr>
+          <p:cNvPr id="20" name="直接连接符 19">
+            <a:extLst>
+              <a:ext uri="{FF2B5EF4-FFF2-40B4-BE49-F238E27FC236}">
+                <a16:creationId xmlns:a16="http://schemas.microsoft.com/office/drawing/2014/main" id="{79BEF017-A743-42B3-80C5-8AE41456A737}"/>
+              </a:ext>
+            </a:extLst>
+          </p:cNvPr>
+          <p:cNvCxnSpPr/>
+          <p:nvPr/>
+        </p:nvCxnSpPr>
+        <p:spPr>
+          <a:xfrm flipH="1" flipV="1">
+            <a:off x="3277918" y="5517232"/>
+            <a:ext cx="2304256" cy="1"/>
+          </a:xfrm>
+          <a:prstGeom prst="line">
+            <a:avLst/>
+          </a:prstGeom>
+        </p:spPr>
+        <p:style>
+          <a:lnRef idx="1">
+            <a:schemeClr val="accent1"/>
+          </a:lnRef>
+          <a:fillRef idx="0">
+            <a:schemeClr val="accent1"/>
+          </a:fillRef>
+          <a:effectRef idx="0">
+            <a:schemeClr val="accent1"/>
+          </a:effectRef>
+          <a:fontRef idx="minor">
+            <a:schemeClr val="tx1"/>
+          </a:fontRef>
+        </p:style>
+      </p:cxnSp>
+      <p:sp>
+        <p:nvSpPr>
+          <p:cNvPr id="21" name="文本框 20">
+            <a:extLst>
+              <a:ext uri="{FF2B5EF4-FFF2-40B4-BE49-F238E27FC236}">
+                <a16:creationId xmlns:a16="http://schemas.microsoft.com/office/drawing/2014/main" id="{39FA1922-B7B6-452E-BFF9-C8219BEA9E17}"/>
+              </a:ext>
+            </a:extLst>
+          </p:cNvPr>
+          <p:cNvSpPr txBox="1"/>
+          <p:nvPr/>
+        </p:nvSpPr>
+        <p:spPr>
+          <a:xfrm>
+            <a:off x="3453936" y="4538736"/>
+            <a:ext cx="1265411" cy="369332"/>
+          </a:xfrm>
+          <a:prstGeom prst="rect">
+            <a:avLst/>
+          </a:prstGeom>
+          <a:noFill/>
+        </p:spPr>
+        <p:txBody>
+          <a:bodyPr wrap="none" rtlCol="0">
+            <a:spAutoFit/>
+          </a:bodyPr>
+          <a:lstStyle/>
+          <a:p>
+            <a:r>
+              <a:rPr lang="en-US" altLang="zh-CN" dirty="0" err="1"/>
+              <a:t>Head.width</a:t>
+            </a:r>
+            <a:endParaRPr lang="zh-CN" altLang="en-US" dirty="0"/>
+          </a:p>
+        </p:txBody>
+      </p:sp>
+      <p:cxnSp>
+        <p:nvCxnSpPr>
+          <p:cNvPr id="22" name="直接连接符 21">
+            <a:extLst>
+              <a:ext uri="{FF2B5EF4-FFF2-40B4-BE49-F238E27FC236}">
+                <a16:creationId xmlns:a16="http://schemas.microsoft.com/office/drawing/2014/main" id="{4B06CC1C-5AB5-4D00-A8CD-0BCD538D82F7}"/>
+              </a:ext>
+            </a:extLst>
+          </p:cNvPr>
+          <p:cNvCxnSpPr>
+            <a:stCxn id="3" idx="0"/>
+          </p:cNvCxnSpPr>
+          <p:nvPr/>
+        </p:nvCxnSpPr>
+        <p:spPr>
+          <a:xfrm>
+            <a:off x="5004048" y="4797152"/>
+            <a:ext cx="0" cy="1656184"/>
+          </a:xfrm>
+          <a:prstGeom prst="line">
+            <a:avLst/>
+          </a:prstGeom>
+        </p:spPr>
+        <p:style>
+          <a:lnRef idx="1">
+            <a:schemeClr val="accent1"/>
+          </a:lnRef>
+          <a:fillRef idx="0">
+            <a:schemeClr val="accent1"/>
+          </a:fillRef>
+          <a:effectRef idx="0">
+            <a:schemeClr val="accent1"/>
+          </a:effectRef>
+          <a:fontRef idx="minor">
+            <a:schemeClr val="tx1"/>
+          </a:fontRef>
+        </p:style>
+      </p:cxnSp>
+      <p:cxnSp>
+        <p:nvCxnSpPr>
+          <p:cNvPr id="24" name="直接连接符 23">
+            <a:extLst>
+              <a:ext uri="{FF2B5EF4-FFF2-40B4-BE49-F238E27FC236}">
+                <a16:creationId xmlns:a16="http://schemas.microsoft.com/office/drawing/2014/main" id="{1F25ECD6-8060-4A3D-876A-61E5619B410A}"/>
+              </a:ext>
+            </a:extLst>
+          </p:cNvPr>
+          <p:cNvCxnSpPr>
+            <a:stCxn id="3" idx="3"/>
+          </p:cNvCxnSpPr>
+          <p:nvPr/>
+        </p:nvCxnSpPr>
+        <p:spPr>
+          <a:xfrm>
+            <a:off x="5580112" y="4797152"/>
+            <a:ext cx="0" cy="1728192"/>
+          </a:xfrm>
+          <a:prstGeom prst="line">
+            <a:avLst/>
+          </a:prstGeom>
+        </p:spPr>
+        <p:style>
+          <a:lnRef idx="1">
+            <a:schemeClr val="accent1"/>
+          </a:lnRef>
+          <a:fillRef idx="0">
+            <a:schemeClr val="accent1"/>
+          </a:fillRef>
+          <a:effectRef idx="0">
+            <a:schemeClr val="accent1"/>
+          </a:effectRef>
+          <a:fontRef idx="minor">
+            <a:schemeClr val="tx1"/>
+          </a:fontRef>
+        </p:style>
+      </p:cxnSp>
+      <p:sp>
+        <p:nvSpPr>
+          <p:cNvPr id="25" name="文本框 24">
+            <a:extLst>
+              <a:ext uri="{FF2B5EF4-FFF2-40B4-BE49-F238E27FC236}">
+                <a16:creationId xmlns:a16="http://schemas.microsoft.com/office/drawing/2014/main" id="{73D8DCCB-BEAB-4734-9C0D-EDE6EB45E42C}"/>
+              </a:ext>
+            </a:extLst>
+          </p:cNvPr>
+          <p:cNvSpPr txBox="1"/>
+          <p:nvPr/>
+        </p:nvSpPr>
+        <p:spPr>
+          <a:xfrm>
+            <a:off x="4788024" y="6156012"/>
+            <a:ext cx="1170064" cy="369332"/>
+          </a:xfrm>
+          <a:prstGeom prst="rect">
+            <a:avLst/>
+          </a:prstGeom>
+          <a:noFill/>
+        </p:spPr>
+        <p:txBody>
+          <a:bodyPr wrap="none" rtlCol="0">
+            <a:spAutoFit/>
+          </a:bodyPr>
+          <a:lstStyle/>
+          <a:p>
+            <a:r>
+              <a:rPr lang="en-US" altLang="zh-CN" dirty="0" err="1"/>
+              <a:t>Head.ratio</a:t>
+            </a:r>
+            <a:endParaRPr lang="zh-CN" altLang="en-US" dirty="0"/>
+          </a:p>
+        </p:txBody>
+      </p:sp>
+      <p:sp>
+        <p:nvSpPr>
+          <p:cNvPr id="28" name="梯形 27">
+            <a:extLst>
+              <a:ext uri="{FF2B5EF4-FFF2-40B4-BE49-F238E27FC236}">
+                <a16:creationId xmlns:a16="http://schemas.microsoft.com/office/drawing/2014/main" id="{58360547-70C9-4777-8E49-A8A21172EA75}"/>
+              </a:ext>
+            </a:extLst>
+          </p:cNvPr>
+          <p:cNvSpPr/>
+          <p:nvPr/>
+        </p:nvSpPr>
+        <p:spPr>
+          <a:xfrm rot="5400000">
+            <a:off x="5885619" y="3801508"/>
+            <a:ext cx="1430144" cy="1991287"/>
+          </a:xfrm>
+          <a:prstGeom prst="trapezoid">
+            <a:avLst/>
+          </a:prstGeom>
+          <a:solidFill>
+            <a:schemeClr val="bg1">
+              <a:lumMod val="75000"/>
+            </a:schemeClr>
+          </a:solidFill>
+          <a:ln>
+            <a:solidFill>
+              <a:schemeClr val="bg1">
+                <a:lumMod val="75000"/>
+              </a:schemeClr>
+            </a:solidFill>
+          </a:ln>
+        </p:spPr>
+        <p:style>
+          <a:lnRef idx="2">
+            <a:schemeClr val="accent1">
+              <a:shade val="50000"/>
+            </a:schemeClr>
+          </a:lnRef>
+          <a:fillRef idx="1">
+            <a:schemeClr val="accent1"/>
+          </a:fillRef>
+          <a:effectRef idx="0">
+            <a:schemeClr val="accent1"/>
+          </a:effectRef>
+          <a:fontRef idx="minor">
+            <a:schemeClr val="lt1"/>
+          </a:fontRef>
+        </p:style>
+        <p:txBody>
+          <a:bodyPr rtlCol="0" anchor="ctr"/>
+          <a:lstStyle/>
+          <a:p>
+            <a:pPr algn="ctr"/>
+            <a:endParaRPr lang="zh-CN" altLang="en-US"/>
           </a:p>
         </p:txBody>
       </p:sp>
@@ -5204,124 +5524,112 @@
           <a:lstStyle/>
           <a:p>
             <a:r>
-              <a:rPr lang="zh-CN" altLang="en-US" dirty="0" smtClean="0"/>
+              <a:rPr lang="zh-CN" altLang="en-US" dirty="0"/>
               <a:t>参数：</a:t>
             </a:r>
             <a:endParaRPr lang="en-US" altLang="zh-CN" dirty="0"/>
           </a:p>
           <a:p>
             <a:r>
-              <a:rPr lang="en-US" altLang="zh-CN" dirty="0" smtClean="0"/>
+              <a:rPr lang="en-US" altLang="zh-CN" dirty="0"/>
               <a:t>Type: intro out/ all in / all out</a:t>
             </a:r>
           </a:p>
           <a:p>
             <a:r>
-              <a:rPr lang="en-US" altLang="zh-CN" dirty="0" smtClean="0"/>
+              <a:rPr lang="en-US" altLang="zh-CN" dirty="0"/>
               <a:t>Directional  </a:t>
             </a:r>
             <a:r>
-              <a:rPr lang="zh-CN" altLang="en-US" dirty="0" smtClean="0"/>
+              <a:rPr lang="zh-CN" altLang="en-US" dirty="0"/>
               <a:t>弄一个方框可以勾选的  默认不勾</a:t>
             </a:r>
-            <a:endParaRPr lang="en-US" altLang="zh-CN" dirty="0" smtClean="0"/>
-          </a:p>
-          <a:p>
-            <a:r>
-              <a:rPr lang="en-US" altLang="zh-CN" dirty="0" smtClean="0"/>
+            <a:endParaRPr lang="en-US" altLang="zh-CN" dirty="0"/>
+          </a:p>
+          <a:p>
+            <a:r>
+              <a:rPr lang="en-US" altLang="zh-CN" dirty="0"/>
               <a:t>Border: 1</a:t>
             </a:r>
           </a:p>
           <a:p>
             <a:r>
-              <a:rPr lang="en-US" altLang="zh-CN" dirty="0" err="1" smtClean="0"/>
+              <a:rPr lang="en-US" altLang="zh-CN" dirty="0" err="1"/>
               <a:t>Lty</a:t>
             </a:r>
             <a:r>
-              <a:rPr lang="en-US" altLang="zh-CN" dirty="0" smtClean="0"/>
+              <a:rPr lang="en-US" altLang="zh-CN" dirty="0"/>
               <a:t>: solid   </a:t>
             </a:r>
             <a:r>
-              <a:rPr lang="zh-CN" altLang="en-US" dirty="0" smtClean="0"/>
-              <a:t>线条</a:t>
-            </a:r>
-            <a:r>
-              <a:rPr lang="zh-CN" altLang="en-US" dirty="0"/>
-              <a:t>类型</a:t>
-            </a:r>
-            <a:endParaRPr lang="en-US" altLang="zh-CN" dirty="0" smtClean="0"/>
-          </a:p>
-          <a:p>
-            <a:r>
-              <a:rPr lang="en-US" altLang="zh-CN" dirty="0" err="1" smtClean="0"/>
+              <a:rPr lang="zh-CN" altLang="en-US" dirty="0"/>
+              <a:t>线条类型</a:t>
+            </a:r>
+            <a:endParaRPr lang="en-US" altLang="zh-CN" dirty="0"/>
+          </a:p>
+          <a:p>
+            <a:r>
+              <a:rPr lang="en-US" altLang="zh-CN" dirty="0" err="1"/>
               <a:t>Colfun</a:t>
             </a:r>
             <a:r>
-              <a:rPr lang="en-US" altLang="zh-CN" dirty="0" smtClean="0"/>
+              <a:rPr lang="en-US" altLang="zh-CN" dirty="0"/>
               <a:t>: ramp / rainbow / none</a:t>
             </a:r>
           </a:p>
           <a:p>
             <a:r>
-              <a:rPr lang="en-US" altLang="zh-CN" dirty="0" err="1" smtClean="0"/>
+              <a:rPr lang="en-US" altLang="zh-CN" dirty="0" err="1"/>
               <a:t>Colfun</a:t>
             </a:r>
             <a:r>
-              <a:rPr lang="zh-CN" altLang="en-US" dirty="0" smtClean="0"/>
+              <a:rPr lang="zh-CN" altLang="en-US" dirty="0"/>
               <a:t>为</a:t>
             </a:r>
             <a:r>
-              <a:rPr lang="en-US" altLang="zh-CN" dirty="0" smtClean="0"/>
+              <a:rPr lang="en-US" altLang="zh-CN" dirty="0"/>
               <a:t>ramp</a:t>
             </a:r>
             <a:r>
-              <a:rPr lang="zh-CN" altLang="en-US" dirty="0" smtClean="0"/>
+              <a:rPr lang="zh-CN" altLang="en-US" dirty="0"/>
               <a:t>时</a:t>
             </a:r>
             <a:r>
               <a:rPr lang="en-US" altLang="zh-CN" dirty="0"/>
+              <a:t> Col:  </a:t>
+            </a:r>
+            <a:r>
+              <a:rPr lang="en-US" altLang="zh-CN" dirty="0" err="1"/>
+              <a:t>blue,green,yellow,red,darkred</a:t>
+            </a:r>
+            <a:r>
+              <a:rPr lang="en-US" altLang="zh-CN" dirty="0"/>
               <a:t> </a:t>
             </a:r>
-            <a:r>
-              <a:rPr lang="en-US" altLang="zh-CN" dirty="0" smtClean="0"/>
-              <a:t>Col</a:t>
-            </a:r>
-            <a:r>
-              <a:rPr lang="en-US" altLang="zh-CN" dirty="0"/>
-              <a:t>:  </a:t>
-            </a:r>
-            <a:r>
-              <a:rPr lang="en-US" altLang="zh-CN" dirty="0" err="1" smtClean="0"/>
-              <a:t>blue,green,yellow,red,darkred</a:t>
-            </a:r>
-            <a:r>
-              <a:rPr lang="en-US" altLang="zh-CN" dirty="0" smtClean="0"/>
-              <a:t> </a:t>
-            </a:r>
-          </a:p>
-          <a:p>
-            <a:r>
-              <a:rPr lang="en-US" altLang="zh-CN" dirty="0" err="1" smtClean="0"/>
+          </a:p>
+          <a:p>
+            <a:r>
+              <a:rPr lang="en-US" altLang="zh-CN" dirty="0" err="1"/>
               <a:t>Colfun</a:t>
             </a:r>
             <a:r>
-              <a:rPr lang="zh-CN" altLang="en-US" dirty="0" smtClean="0"/>
+              <a:rPr lang="zh-CN" altLang="en-US" dirty="0"/>
               <a:t>为</a:t>
             </a:r>
             <a:r>
-              <a:rPr lang="en-US" altLang="zh-CN" dirty="0" smtClean="0"/>
+              <a:rPr lang="en-US" altLang="zh-CN" dirty="0"/>
               <a:t>none</a:t>
             </a:r>
             <a:r>
-              <a:rPr lang="zh-CN" altLang="en-US" dirty="0" smtClean="0"/>
+              <a:rPr lang="zh-CN" altLang="en-US" dirty="0"/>
               <a:t>时</a:t>
             </a:r>
             <a:r>
-              <a:rPr lang="en-US" altLang="zh-CN" dirty="0" smtClean="0"/>
+              <a:rPr lang="en-US" altLang="zh-CN" dirty="0"/>
               <a:t>  </a:t>
             </a:r>
             <a:r>
-              <a:rPr lang="en-US" altLang="zh-CN" dirty="0" err="1" smtClean="0"/>
+              <a:rPr lang="en-US" altLang="zh-CN" dirty="0" err="1"/>
               <a:t>Col:black</a:t>
             </a:r>
             <a:endParaRPr lang="zh-CN" altLang="en-US" dirty="0"/>
@@ -5329,21 +5637,13 @@
           <a:p>
             <a:r>
               <a:rPr lang="en-US" altLang="zh-CN" dirty="0"/>
-              <a:t>thermometer </a:t>
-            </a:r>
-            <a:r>
-              <a:rPr lang="en-US" altLang="zh-CN" dirty="0" smtClean="0"/>
-              <a:t>bar</a:t>
-            </a:r>
-            <a:r>
-              <a:rPr lang="zh-CN" altLang="en-US" dirty="0"/>
-              <a:t>弄一个方框可以勾选的  </a:t>
-            </a:r>
-            <a:r>
-              <a:rPr lang="zh-CN" altLang="en-US" dirty="0" smtClean="0"/>
-              <a:t>默认勾</a:t>
-            </a:r>
-            <a:endParaRPr lang="en-US" altLang="zh-CN" dirty="0" smtClean="0"/>
+              <a:t>thermometer bar</a:t>
+            </a:r>
+            <a:r>
+              <a:rPr lang="zh-CN" altLang="en-US" dirty="0"/>
+              <a:t>弄一个方框可以勾选的  默认勾</a:t>
+            </a:r>
+            <a:endParaRPr lang="en-US" altLang="zh-CN" dirty="0"/>
           </a:p>
         </p:txBody>
       </p:sp>
@@ -5370,11 +5670,11 @@
           <a:lstStyle/>
           <a:p>
             <a:r>
-              <a:rPr lang="en-US" altLang="zh-CN" dirty="0" smtClean="0"/>
+              <a:rPr lang="en-US" altLang="zh-CN" dirty="0"/>
               <a:t>Link file</a:t>
             </a:r>
             <a:r>
-              <a:rPr lang="zh-CN" altLang="en-US" dirty="0" smtClean="0"/>
+              <a:rPr lang="zh-CN" altLang="en-US" dirty="0"/>
               <a:t>相关</a:t>
             </a:r>
             <a:r>
@@ -5383,23 +5683,7 @@
             </a:r>
             <a:r>
               <a:rPr lang="zh-CN" altLang="en-US" dirty="0"/>
-              <a:t>该文件</a:t>
-            </a:r>
-            <a:r>
-              <a:rPr lang="zh-CN" altLang="en-US" dirty="0" smtClean="0"/>
-              <a:t>没有</a:t>
-            </a:r>
-            <a:r>
-              <a:rPr lang="zh-CN" altLang="en-US" dirty="0"/>
-              <a:t>也</a:t>
-            </a:r>
-            <a:r>
-              <a:rPr lang="zh-CN" altLang="en-US" dirty="0" smtClean="0"/>
-              <a:t>可以</a:t>
-            </a:r>
-            <a:r>
-              <a:rPr lang="zh-CN" altLang="en-US" dirty="0"/>
-              <a:t>画图</a:t>
+              <a:t>该文件没有也可以画图</a:t>
             </a:r>
           </a:p>
         </p:txBody>
@@ -5427,10 +5711,9 @@
           <a:lstStyle/>
           <a:p>
             <a:r>
-              <a:rPr lang="zh-CN" altLang="en-US" dirty="0" smtClean="0"/>
+              <a:rPr lang="zh-CN" altLang="en-US" dirty="0"/>
               <a:t>数据格式</a:t>
             </a:r>
-            <a:endParaRPr lang="zh-CN" altLang="en-US" dirty="0"/>
           </a:p>
         </p:txBody>
       </p:sp>
@@ -5584,50 +5867,46 @@
           <a:lstStyle/>
           <a:p>
             <a:r>
-              <a:rPr lang="en-US" altLang="zh-CN" dirty="0" err="1" smtClean="0"/>
-              <a:t>Stre</a:t>
-            </a:r>
-            <a:r>
-              <a:rPr lang="zh-CN" altLang="en-US" dirty="0" smtClean="0"/>
-              <a:t>对应线条颜色</a:t>
-            </a:r>
-            <a:r>
-              <a:rPr lang="en-US" altLang="zh-CN" dirty="0" smtClean="0"/>
-              <a:t>, </a:t>
-            </a:r>
-            <a:r>
-              <a:rPr lang="en-US" altLang="zh-CN" dirty="0" err="1" smtClean="0"/>
-              <a:t>lwd</a:t>
-            </a:r>
-            <a:r>
-              <a:rPr lang="zh-CN" altLang="en-US" dirty="0" smtClean="0"/>
-              <a:t>对应线条粗细</a:t>
-            </a:r>
-            <a:r>
-              <a:rPr lang="en-US" altLang="zh-CN" dirty="0" smtClean="0"/>
-              <a:t>(</a:t>
-            </a:r>
-            <a:r>
-              <a:rPr lang="zh-CN" altLang="en-US" dirty="0" smtClean="0"/>
-              <a:t>没有就用固定值）</a:t>
-            </a:r>
-            <a:endParaRPr lang="en-US" altLang="zh-CN" dirty="0" smtClean="0"/>
-          </a:p>
-          <a:p>
-            <a:r>
-              <a:rPr lang="zh-CN" altLang="en-US" dirty="0" smtClean="0"/>
-              <a:t>当</a:t>
-            </a:r>
-            <a:r>
-              <a:rPr lang="zh-CN" altLang="en-US" dirty="0"/>
-              <a:t>没有</a:t>
-            </a:r>
-            <a:r>
               <a:rPr lang="en-US" altLang="zh-CN" dirty="0" err="1"/>
               <a:t>Stre</a:t>
             </a:r>
             <a:r>
               <a:rPr lang="zh-CN" altLang="en-US" dirty="0"/>
+              <a:t>对应线条颜色</a:t>
+            </a:r>
+            <a:r>
+              <a:rPr lang="en-US" altLang="zh-CN" dirty="0"/>
+              <a:t>, </a:t>
+            </a:r>
+            <a:r>
+              <a:rPr lang="en-US" altLang="zh-CN" dirty="0" err="1"/>
+              <a:t>lwd</a:t>
+            </a:r>
+            <a:r>
+              <a:rPr lang="zh-CN" altLang="en-US" dirty="0"/>
+              <a:t>对应线条粗细</a:t>
+            </a:r>
+            <a:r>
+              <a:rPr lang="en-US" altLang="zh-CN" dirty="0"/>
+              <a:t>(</a:t>
+            </a:r>
+            <a:r>
+              <a:rPr lang="zh-CN" altLang="en-US" dirty="0"/>
+              <a:t>没有就用固定值）</a:t>
+            </a:r>
+            <a:endParaRPr lang="en-US" altLang="zh-CN" dirty="0"/>
+          </a:p>
+          <a:p>
+            <a:r>
+              <a:rPr lang="zh-CN" altLang="en-US" dirty="0"/>
+              <a:t>当没有</a:t>
+            </a:r>
+            <a:r>
+              <a:rPr lang="en-US" altLang="zh-CN" dirty="0" err="1"/>
+              <a:t>Stre</a:t>
+            </a:r>
+            <a:r>
+              <a:rPr lang="zh-CN" altLang="en-US" dirty="0"/>
               <a:t>这一行的时候 </a:t>
             </a:r>
             <a:r>
@@ -5654,38 +5933,34 @@
               <a:t>选为</a:t>
             </a:r>
             <a:r>
-              <a:rPr lang="en-US" altLang="zh-CN" dirty="0" smtClean="0"/>
+              <a:rPr lang="en-US" altLang="zh-CN" dirty="0"/>
               <a:t>none</a:t>
             </a:r>
             <a:r>
-              <a:rPr lang="zh-CN" altLang="en-US" dirty="0" smtClean="0"/>
+              <a:rPr lang="zh-CN" altLang="en-US" dirty="0"/>
               <a:t>时</a:t>
             </a:r>
             <a:r>
-              <a:rPr lang="en-US" altLang="zh-CN" dirty="0" smtClean="0"/>
+              <a:rPr lang="en-US" altLang="zh-CN" dirty="0"/>
               <a:t>, </a:t>
             </a:r>
             <a:r>
               <a:rPr lang="zh-CN" altLang="en-US" dirty="0"/>
-              <a:t>线条</a:t>
-            </a:r>
-            <a:r>
-              <a:rPr lang="zh-CN" altLang="en-US" dirty="0" smtClean="0"/>
-              <a:t>颜色固定，就以</a:t>
-            </a:r>
-            <a:r>
-              <a:rPr lang="en-US" altLang="zh-CN" dirty="0" smtClean="0"/>
+              <a:t>线条颜色固定，就以</a:t>
+            </a:r>
+            <a:r>
+              <a:rPr lang="en-US" altLang="zh-CN" dirty="0"/>
               <a:t>col</a:t>
             </a:r>
             <a:r>
-              <a:rPr lang="zh-CN" altLang="en-US" dirty="0" smtClean="0"/>
+              <a:rPr lang="zh-CN" altLang="en-US" dirty="0"/>
               <a:t>颜色为准</a:t>
             </a:r>
-            <a:endParaRPr lang="en-US" altLang="zh-CN" dirty="0" smtClean="0"/>
-          </a:p>
-          <a:p>
-            <a:r>
-              <a:rPr lang="zh-CN" altLang="en-US" dirty="0" smtClean="0"/>
+            <a:endParaRPr lang="en-US" altLang="zh-CN" dirty="0"/>
+          </a:p>
+          <a:p>
+            <a:r>
+              <a:rPr lang="zh-CN" altLang="en-US" dirty="0"/>
               <a:t>当</a:t>
             </a:r>
             <a:r>
@@ -5697,45 +5972,45 @@
               <a:t>选为</a:t>
             </a:r>
             <a:r>
-              <a:rPr lang="en-US" altLang="zh-CN" dirty="0" smtClean="0"/>
+              <a:rPr lang="en-US" altLang="zh-CN" dirty="0"/>
               <a:t>ramp</a:t>
             </a:r>
             <a:r>
-              <a:rPr lang="zh-CN" altLang="en-US" dirty="0" smtClean="0"/>
+              <a:rPr lang="zh-CN" altLang="en-US" dirty="0"/>
               <a:t>时，就显示</a:t>
             </a:r>
             <a:r>
-              <a:rPr lang="en-US" altLang="zh-CN" dirty="0" smtClean="0"/>
+              <a:rPr lang="en-US" altLang="zh-CN" dirty="0"/>
               <a:t>thermometer bar</a:t>
             </a:r>
           </a:p>
           <a:p>
             <a:r>
-              <a:rPr lang="zh-CN" altLang="en-US" dirty="0" smtClean="0"/>
+              <a:rPr lang="zh-CN" altLang="en-US" dirty="0"/>
               <a:t>当</a:t>
             </a:r>
             <a:r>
-              <a:rPr lang="en-US" altLang="zh-CN" dirty="0" err="1" smtClean="0"/>
+              <a:rPr lang="en-US" altLang="zh-CN" dirty="0" err="1"/>
               <a:t>colfun</a:t>
             </a:r>
             <a:r>
-              <a:rPr lang="zh-CN" altLang="en-US" dirty="0" smtClean="0"/>
+              <a:rPr lang="zh-CN" altLang="en-US" dirty="0"/>
               <a:t>为</a:t>
             </a:r>
             <a:r>
-              <a:rPr lang="en-US" altLang="zh-CN" dirty="0" smtClean="0"/>
+              <a:rPr lang="en-US" altLang="zh-CN" dirty="0"/>
               <a:t>rainbow</a:t>
             </a:r>
             <a:r>
-              <a:rPr lang="zh-CN" altLang="en-US" dirty="0" smtClean="0"/>
+              <a:rPr lang="zh-CN" altLang="en-US" dirty="0"/>
               <a:t>时，</a:t>
             </a:r>
             <a:r>
-              <a:rPr lang="en-US" altLang="zh-CN" dirty="0" err="1" smtClean="0"/>
+              <a:rPr lang="en-US" altLang="zh-CN" dirty="0" err="1"/>
               <a:t>Stre</a:t>
             </a:r>
             <a:r>
-              <a:rPr lang="zh-CN" altLang="en-US" dirty="0" smtClean="0"/>
+              <a:rPr lang="zh-CN" altLang="en-US" dirty="0"/>
               <a:t>这一行可以不是数字</a:t>
             </a:r>
             <a:endParaRPr lang="en-US" altLang="zh-CN" dirty="0"/>
@@ -5765,68 +6040,67 @@
           <a:lstStyle/>
           <a:p>
             <a:r>
-              <a:rPr lang="en-US" altLang="zh-CN" dirty="0" smtClean="0"/>
+              <a:rPr lang="en-US" altLang="zh-CN" dirty="0"/>
               <a:t>Type</a:t>
             </a:r>
             <a:r>
-              <a:rPr lang="zh-CN" altLang="en-US" dirty="0" smtClean="0"/>
+              <a:rPr lang="zh-CN" altLang="en-US" dirty="0"/>
               <a:t>为</a:t>
             </a:r>
             <a:r>
-              <a:rPr lang="en-US" altLang="zh-CN" dirty="0" smtClean="0"/>
+              <a:rPr lang="en-US" altLang="zh-CN" dirty="0"/>
               <a:t>intro out</a:t>
             </a:r>
             <a:r>
-              <a:rPr lang="zh-CN" altLang="en-US" dirty="0" smtClean="0"/>
+              <a:rPr lang="zh-CN" altLang="en-US" dirty="0"/>
               <a:t>时  方块内部的连线画在圆外</a:t>
             </a:r>
             <a:r>
-              <a:rPr lang="en-US" altLang="zh-CN" dirty="0" smtClean="0"/>
+              <a:rPr lang="en-US" altLang="zh-CN" dirty="0"/>
               <a:t>,</a:t>
             </a:r>
             <a:r>
-              <a:rPr lang="zh-CN" altLang="en-US" dirty="0" smtClean="0"/>
+              <a:rPr lang="zh-CN" altLang="en-US" dirty="0"/>
               <a:t>其他画圆内</a:t>
             </a:r>
-            <a:endParaRPr lang="en-US" altLang="zh-CN" dirty="0" smtClean="0"/>
-          </a:p>
-          <a:p>
-            <a:r>
-              <a:rPr lang="en-US" altLang="zh-CN" dirty="0" smtClean="0"/>
+            <a:endParaRPr lang="en-US" altLang="zh-CN" dirty="0"/>
+          </a:p>
+          <a:p>
+            <a:r>
+              <a:rPr lang="en-US" altLang="zh-CN" dirty="0"/>
               <a:t>Type</a:t>
             </a:r>
             <a:r>
-              <a:rPr lang="zh-CN" altLang="en-US" dirty="0" smtClean="0"/>
+              <a:rPr lang="zh-CN" altLang="en-US" dirty="0"/>
               <a:t>为</a:t>
             </a:r>
             <a:r>
-              <a:rPr lang="en-US" altLang="zh-CN" dirty="0" smtClean="0"/>
+              <a:rPr lang="en-US" altLang="zh-CN" dirty="0"/>
               <a:t>all in , </a:t>
             </a:r>
             <a:r>
-              <a:rPr lang="zh-CN" altLang="en-US" dirty="0" smtClean="0"/>
+              <a:rPr lang="zh-CN" altLang="en-US" dirty="0"/>
               <a:t>连线画内部</a:t>
             </a:r>
-            <a:endParaRPr lang="en-US" altLang="zh-CN" dirty="0" smtClean="0"/>
-          </a:p>
-          <a:p>
-            <a:r>
-              <a:rPr lang="en-US" altLang="zh-CN" dirty="0" smtClean="0"/>
+            <a:endParaRPr lang="en-US" altLang="zh-CN" dirty="0"/>
+          </a:p>
+          <a:p>
+            <a:r>
+              <a:rPr lang="en-US" altLang="zh-CN" dirty="0"/>
               <a:t>Type </a:t>
             </a:r>
             <a:r>
-              <a:rPr lang="zh-CN" altLang="en-US" dirty="0" smtClean="0"/>
+              <a:rPr lang="zh-CN" altLang="en-US" dirty="0"/>
               <a:t>为</a:t>
             </a:r>
             <a:r>
-              <a:rPr lang="en-US" altLang="zh-CN" dirty="0" smtClean="0"/>
+              <a:rPr lang="en-US" altLang="zh-CN" dirty="0"/>
               <a:t>all out  </a:t>
             </a:r>
             <a:r>
-              <a:rPr lang="zh-CN" altLang="en-US" dirty="0" smtClean="0"/>
+              <a:rPr lang="zh-CN" altLang="en-US" dirty="0"/>
               <a:t>连线画外部</a:t>
             </a:r>
-            <a:endParaRPr lang="zh-CN" altLang="en-US" dirty="0"/>
           </a:p>
         </p:txBody>
       </p:sp>
@@ -5853,14 +6127,13 @@
           <a:lstStyle/>
           <a:p>
             <a:r>
-              <a:rPr lang="en-US" altLang="zh-CN" dirty="0" smtClean="0"/>
+              <a:rPr lang="en-US" altLang="zh-CN" dirty="0"/>
               <a:t>Link file</a:t>
             </a:r>
             <a:r>
-              <a:rPr lang="zh-CN" altLang="en-US" dirty="0" smtClean="0"/>
+              <a:rPr lang="zh-CN" altLang="en-US" dirty="0"/>
               <a:t>可以上传多个文件 每个文件单独设置参数</a:t>
             </a:r>
-            <a:endParaRPr lang="zh-CN" altLang="en-US" dirty="0"/>
           </a:p>
         </p:txBody>
       </p:sp>

</xml_diff>